<commit_message>
init talk slide & landing page
</commit_message>
<xml_diff>
--- a/docs/2024-Stat-Research-Day.pptx
+++ b/docs/2024-Stat-Research-Day.pptx
@@ -208,7 +208,7 @@
           <a:p>
             <a:fld id="{ECD1C33D-175C-4448-AC53-4345F676D392}" type="datetimeFigureOut">
               <a:rPr lang="en-US" smtClean="0"/>
-              <a:t>2/2/23</a:t>
+              <a:t>1/30/24</a:t>
             </a:fld>
             <a:endParaRPr lang="en-US" dirty="0"/>
           </a:p>
@@ -1991,7 +1991,7 @@
           <a:p>
             <a:fld id="{6FEC4368-C769-8143-B102-F97927FA2E0C}" type="datetimeFigureOut">
               <a:rPr lang="en-US" smtClean="0"/>
-              <a:t>2/2/23</a:t>
+              <a:t>1/30/24</a:t>
             </a:fld>
             <a:endParaRPr lang="en-US" dirty="0"/>
           </a:p>
@@ -2369,13 +2369,13 @@
         </p:nvSpPr>
         <p:spPr>
           <a:xfrm>
-            <a:off x="111302" y="0"/>
-            <a:ext cx="4373456" cy="6858000"/>
+            <a:off x="111301" y="127748"/>
+            <a:ext cx="4809074" cy="6730252"/>
           </a:xfrm>
         </p:spPr>
         <p:txBody>
           <a:bodyPr>
-            <a:normAutofit fontScale="92500" lnSpcReduction="10000"/>
+            <a:normAutofit fontScale="92500" lnSpcReduction="20000"/>
           </a:bodyPr>
           <a:lstStyle/>
           <a:p>
@@ -2388,183 +2388,206 @@
                   <a:schemeClr val="accent2"/>
                 </a:solidFill>
               </a:rPr>
-              <a:t>Educational Assessment</a:t>
-            </a:r>
-          </a:p>
-          <a:p>
-            <a:r>
-              <a:rPr lang="en-US" sz="1200" b="1" i="0" dirty="0">
+              <a:t>Progress toward NLP-assisted formative assessment feedback</a:t>
+            </a:r>
+            <a:endParaRPr lang="en-US" sz="2000" b="1" i="0" dirty="0">
+              <a:solidFill>
+                <a:schemeClr val="accent2"/>
+              </a:solidFill>
+              <a:effectLst/>
+              <a:latin typeface="Helvetica Neue" panose="02000503000000020004" pitchFamily="2" charset="0"/>
+            </a:endParaRPr>
+          </a:p>
+          <a:p>
+            <a:r>
+              <a:rPr lang="en-US" sz="1100" dirty="0">
+                <a:solidFill>
+                  <a:srgbClr val="333333"/>
+                </a:solidFill>
+                <a:latin typeface="Helvetica Neue" panose="02000503000000020004" pitchFamily="2" charset="0"/>
+              </a:rPr>
+              <a:t>"write-to-learn" tasks improve learning outcomes, yet constructed-response methods become unwieldy when class sizes are large</a:t>
+            </a:r>
+          </a:p>
+          <a:p>
+            <a:r>
+              <a:rPr lang="en-US" sz="1100" dirty="0">
+                <a:solidFill>
+                  <a:srgbClr val="333333"/>
+                </a:solidFill>
+                <a:latin typeface="Helvetica Neue" panose="02000503000000020004" pitchFamily="2" charset="0"/>
+              </a:rPr>
+              <a:t>Logistical obstacles impair pedagogical best practices</a:t>
+            </a:r>
+          </a:p>
+          <a:p>
+            <a:r>
+              <a:rPr lang="en-US" sz="1100" dirty="0">
+                <a:solidFill>
+                  <a:srgbClr val="333333"/>
+                </a:solidFill>
+                <a:latin typeface="Helvetica Neue" panose="02000503000000020004" pitchFamily="2" charset="0"/>
+              </a:rPr>
+              <a:t>Investigating NLP tools with human-in-the-loop architecture to facilitate scalability—improve student benefit while mitigating instructor burden</a:t>
+            </a:r>
+          </a:p>
+          <a:p>
+            <a:endParaRPr lang="en-US" sz="1200" dirty="0">
+              <a:solidFill>
+                <a:srgbClr val="333333"/>
+              </a:solidFill>
+              <a:latin typeface="Helvetica Neue" panose="02000503000000020004" pitchFamily="2" charset="0"/>
+            </a:endParaRPr>
+          </a:p>
+          <a:p>
+            <a:endParaRPr lang="en-US" sz="1200" dirty="0">
+              <a:solidFill>
+                <a:srgbClr val="333333"/>
+              </a:solidFill>
+              <a:latin typeface="Helvetica Neue" panose="02000503000000020004" pitchFamily="2" charset="0"/>
+            </a:endParaRPr>
+          </a:p>
+          <a:p>
+            <a:endParaRPr lang="en-US" sz="1200" dirty="0">
+              <a:solidFill>
+                <a:srgbClr val="333333"/>
+              </a:solidFill>
+              <a:latin typeface="Helvetica Neue" panose="02000503000000020004" pitchFamily="2" charset="0"/>
+            </a:endParaRPr>
+          </a:p>
+          <a:p>
+            <a:endParaRPr lang="en-US" sz="1200" dirty="0">
+              <a:solidFill>
+                <a:srgbClr val="333333"/>
+              </a:solidFill>
+              <a:latin typeface="Helvetica Neue" panose="02000503000000020004" pitchFamily="2" charset="0"/>
+            </a:endParaRPr>
+          </a:p>
+          <a:p>
+            <a:endParaRPr lang="en-US" sz="1200" dirty="0">
+              <a:solidFill>
+                <a:srgbClr val="333333"/>
+              </a:solidFill>
+              <a:latin typeface="Helvetica Neue" panose="02000503000000020004" pitchFamily="2" charset="0"/>
+            </a:endParaRPr>
+          </a:p>
+          <a:p>
+            <a:endParaRPr lang="en-US" sz="1200" dirty="0">
+              <a:solidFill>
+                <a:srgbClr val="333333"/>
+              </a:solidFill>
+              <a:latin typeface="Helvetica Neue" panose="02000503000000020004" pitchFamily="2" charset="0"/>
+            </a:endParaRPr>
+          </a:p>
+          <a:p>
+            <a:endParaRPr lang="en-US" sz="1200" dirty="0">
+              <a:solidFill>
+                <a:srgbClr val="333333"/>
+              </a:solidFill>
+              <a:latin typeface="Helvetica Neue" panose="02000503000000020004" pitchFamily="2" charset="0"/>
+            </a:endParaRPr>
+          </a:p>
+          <a:p>
+            <a:endParaRPr lang="en-US" sz="1200" dirty="0">
+              <a:solidFill>
+                <a:srgbClr val="333333"/>
+              </a:solidFill>
+              <a:latin typeface="Helvetica Neue" panose="02000503000000020004" pitchFamily="2" charset="0"/>
+            </a:endParaRPr>
+          </a:p>
+          <a:p>
+            <a:endParaRPr lang="en-US" sz="1200" dirty="0">
+              <a:solidFill>
+                <a:srgbClr val="333333"/>
+              </a:solidFill>
+              <a:latin typeface="Helvetica Neue" panose="02000503000000020004" pitchFamily="2" charset="0"/>
+            </a:endParaRPr>
+          </a:p>
+          <a:p>
+            <a:endParaRPr lang="en-US" sz="1200" dirty="0">
+              <a:solidFill>
+                <a:srgbClr val="333333"/>
+              </a:solidFill>
+              <a:latin typeface="Helvetica Neue" panose="02000503000000020004" pitchFamily="2" charset="0"/>
+            </a:endParaRPr>
+          </a:p>
+          <a:p>
+            <a:endParaRPr lang="en-US" sz="1200" dirty="0">
+              <a:solidFill>
+                <a:srgbClr val="333333"/>
+              </a:solidFill>
+              <a:latin typeface="Helvetica Neue" panose="02000503000000020004" pitchFamily="2" charset="0"/>
+            </a:endParaRPr>
+          </a:p>
+          <a:p>
+            <a:r>
+              <a:rPr lang="en-US" sz="1100" dirty="0">
+                <a:solidFill>
+                  <a:srgbClr val="333333"/>
+                </a:solidFill>
+                <a:latin typeface="Helvetica Neue" panose="02000503000000020004" pitchFamily="2" charset="0"/>
+              </a:rPr>
+              <a:t>Schematic: Q &gt;&gt; A &gt;&gt; evaluate &gt;&gt; cluster &gt;&gt; feedback</a:t>
+            </a:r>
+          </a:p>
+          <a:p>
+            <a:r>
+              <a:rPr lang="en-US" sz="1100" dirty="0">
+                <a:solidFill>
+                  <a:srgbClr val="333333"/>
+                </a:solidFill>
+                <a:latin typeface="Helvetica Neue" panose="02000503000000020004" pitchFamily="2" charset="0"/>
+              </a:rPr>
+              <a:t>Recent (Susan Lloyd): Classification performance &amp; HIL policy</a:t>
+            </a:r>
+          </a:p>
+          <a:p>
+            <a:r>
+              <a:rPr lang="en-US" sz="1100" b="0" i="0" dirty="0">
                 <a:solidFill>
                   <a:srgbClr val="333333"/>
                 </a:solidFill>
                 <a:effectLst/>
                 <a:latin typeface="Helvetica Neue" panose="02000503000000020004" pitchFamily="2" charset="0"/>
               </a:rPr>
-              <a:t>developing and analyzing tools</a:t>
-            </a:r>
-            <a:r>
-              <a:rPr lang="en-US" sz="1200" b="0" i="0" dirty="0">
+              <a:t>Ongoing (Elle Tang): Implications of language diversity</a:t>
+            </a:r>
+          </a:p>
+          <a:p>
+            <a:r>
+              <a:rPr lang="en-US" sz="1100" b="0" i="0" dirty="0">
                 <a:solidFill>
                   <a:srgbClr val="333333"/>
                 </a:solidFill>
                 <a:effectLst/>
                 <a:latin typeface="Helvetica Neue" panose="02000503000000020004" pitchFamily="2" charset="0"/>
               </a:rPr>
-              <a:t> intended to measure specific learning outcomes</a:t>
-            </a:r>
-          </a:p>
-          <a:p>
-            <a:pPr algn="l">
-              <a:buFont typeface="Arial" panose="020B0604020202020204" pitchFamily="34" charset="0"/>
-              <a:buChar char="•"/>
-            </a:pPr>
-            <a:r>
-              <a:rPr lang="en-US" sz="1200" b="0" i="0" dirty="0">
+              <a:t>Future: Evaluate competing methods of feedback; assess effectiveness, student engagement, scalability, </a:t>
+            </a:r>
+            <a:r>
+              <a:rPr lang="en-US" sz="1100" b="0" i="0" dirty="0" err="1">
                 <a:solidFill>
                   <a:srgbClr val="333333"/>
                 </a:solidFill>
                 <a:effectLst/>
                 <a:latin typeface="Helvetica Neue" panose="02000503000000020004" pitchFamily="2" charset="0"/>
               </a:rPr>
-              <a:t>“tests” for research use across academic institutions; e.g., </a:t>
-            </a:r>
-            <a:r>
-              <a:rPr lang="en-US" sz="1200" b="1" i="0" dirty="0">
+              <a:t>etc</a:t>
+            </a:r>
+            <a:r>
+              <a:rPr lang="en-US" sz="1100" b="0" i="0" dirty="0">
                 <a:solidFill>
                   <a:srgbClr val="333333"/>
                 </a:solidFill>
                 <a:effectLst/>
                 <a:latin typeface="Helvetica Neue" panose="02000503000000020004" pitchFamily="2" charset="0"/>
               </a:rPr>
-              <a:t>intro data science</a:t>
-            </a:r>
-            <a:r>
-              <a:rPr lang="en-US" sz="1200" b="0" i="0" dirty="0">
-                <a:solidFill>
-                  <a:srgbClr val="333333"/>
-                </a:solidFill>
-                <a:effectLst/>
-                <a:latin typeface="Helvetica Neue" panose="02000503000000020004" pitchFamily="2" charset="0"/>
-              </a:rPr>
-              <a:t>, intro </a:t>
-            </a:r>
-            <a:r>
-              <a:rPr lang="en-US" sz="1200" b="1" i="0" dirty="0">
-                <a:solidFill>
-                  <a:srgbClr val="333333"/>
-                </a:solidFill>
-                <a:effectLst/>
-                <a:latin typeface="Helvetica Neue" panose="02000503000000020004" pitchFamily="2" charset="0"/>
-              </a:rPr>
-              <a:t>statistics</a:t>
-            </a:r>
-            <a:r>
-              <a:rPr lang="en-US" sz="1200" b="0" i="0" dirty="0">
-                <a:solidFill>
-                  <a:srgbClr val="333333"/>
-                </a:solidFill>
-                <a:effectLst/>
-                <a:latin typeface="Helvetica Neue" panose="02000503000000020004" pitchFamily="2" charset="0"/>
-              </a:rPr>
-              <a:t>, </a:t>
-            </a:r>
-            <a:r>
-              <a:rPr lang="en-US" sz="1200" b="1" i="0" dirty="0">
-                <a:solidFill>
-                  <a:srgbClr val="333333"/>
-                </a:solidFill>
-                <a:effectLst/>
-                <a:latin typeface="Helvetica Neue" panose="02000503000000020004" pitchFamily="2" charset="0"/>
-              </a:rPr>
-              <a:t>capstone assessment</a:t>
-            </a:r>
-            <a:r>
-              <a:rPr lang="en-US" sz="1200" b="0" i="0" dirty="0">
-                <a:solidFill>
-                  <a:srgbClr val="333333"/>
-                </a:solidFill>
-                <a:effectLst/>
-                <a:latin typeface="Helvetica Neue" panose="02000503000000020004" pitchFamily="2" charset="0"/>
-              </a:rPr>
-              <a:t> just before graduation in statistics</a:t>
-            </a:r>
-          </a:p>
-          <a:p>
-            <a:pPr algn="l">
-              <a:buFont typeface="Arial" panose="020B0604020202020204" pitchFamily="34" charset="0"/>
-              <a:buChar char="•"/>
-            </a:pPr>
-            <a:r>
-              <a:rPr lang="en-US" sz="1200" b="0" i="0" dirty="0">
-                <a:solidFill>
-                  <a:srgbClr val="333333"/>
-                </a:solidFill>
-                <a:effectLst/>
-                <a:latin typeface="Helvetica Neue" panose="02000503000000020004" pitchFamily="2" charset="0"/>
-              </a:rPr>
-              <a:t>formative assessment; e.g., feedback for self-regulated learning and/or adaptive instruction</a:t>
-            </a:r>
-          </a:p>
-          <a:p>
-            <a:pPr marL="0" indent="0" algn="l">
-              <a:buNone/>
-            </a:pPr>
-            <a:r>
-              <a:rPr lang="en-US" sz="1000" b="0" i="0" dirty="0">
-                <a:solidFill>
-                  <a:srgbClr val="333333"/>
-                </a:solidFill>
-                <a:effectLst/>
-                <a:latin typeface="Helvetica Neue" panose="02000503000000020004" pitchFamily="2" charset="0"/>
-              </a:rPr>
-              <a:t>Lloyd, S. E., Beckman, M., Pearl, D., </a:t>
-            </a:r>
-            <a:r>
-              <a:rPr lang="en-US" sz="1000" b="0" i="0" dirty="0" err="1">
-                <a:solidFill>
-                  <a:srgbClr val="333333"/>
-                </a:solidFill>
-                <a:effectLst/>
-                <a:latin typeface="Helvetica Neue" panose="02000503000000020004" pitchFamily="2" charset="0"/>
-              </a:rPr>
-              <a:t>Passonneau</a:t>
-            </a:r>
-            <a:r>
-              <a:rPr lang="en-US" sz="1000" b="0" i="0" dirty="0">
-                <a:solidFill>
-                  <a:srgbClr val="333333"/>
-                </a:solidFill>
-                <a:effectLst/>
-                <a:latin typeface="Helvetica Neue" panose="02000503000000020004" pitchFamily="2" charset="0"/>
-              </a:rPr>
-              <a:t>, R., Li, Z., &amp; Wang, Z. (2022). Foundations for AI-Assisted Formative Assessment Feedback for Short-Answer Tasks in Large-Enrollment Classes. In </a:t>
-            </a:r>
-            <a:r>
-              <a:rPr lang="en-US" sz="1000" b="0" i="1" dirty="0">
-                <a:solidFill>
-                  <a:srgbClr val="333333"/>
-                </a:solidFill>
-                <a:effectLst/>
-                <a:latin typeface="Helvetica Neue" panose="02000503000000020004" pitchFamily="2" charset="0"/>
-              </a:rPr>
-              <a:t>Proceedings of the eleventh international conference on teaching statistics</a:t>
-            </a:r>
-            <a:r>
-              <a:rPr lang="en-US" sz="1000" b="0" i="0" dirty="0">
-                <a:solidFill>
-                  <a:srgbClr val="333333"/>
-                </a:solidFill>
-                <a:effectLst/>
-                <a:latin typeface="Helvetica Neue" panose="02000503000000020004" pitchFamily="2" charset="0"/>
-              </a:rPr>
-              <a:t>. Rosario, Argentina.</a:t>
-            </a:r>
-          </a:p>
-          <a:p>
-            <a:pPr marL="0" indent="0" algn="l">
-              <a:buNone/>
-            </a:pPr>
-            <a:endParaRPr lang="en-US" sz="1200" b="0" i="0" dirty="0">
+              <a:t> </a:t>
+            </a:r>
+          </a:p>
+          <a:p>
+            <a:pPr lvl="1"/>
+            <a:endParaRPr lang="en-US" sz="600" b="0" i="0" dirty="0">
               <a:solidFill>
                 <a:srgbClr val="333333"/>
               </a:solidFill>
@@ -2573,74 +2596,155 @@
             </a:endParaRPr>
           </a:p>
           <a:p>
-            <a:pPr marL="0" indent="0">
+            <a:pPr marL="0" indent="0" algn="l">
               <a:buNone/>
             </a:pPr>
             <a:r>
-              <a:rPr lang="en-US" sz="2000" b="1" dirty="0">
-                <a:solidFill>
-                  <a:schemeClr val="accent2"/>
-                </a:solidFill>
-              </a:rPr>
-              <a:t>Teaching and Learning</a:t>
-            </a:r>
-          </a:p>
-          <a:p>
-            <a:pPr algn="l">
-              <a:buFont typeface="Arial" panose="020B0604020202020204" pitchFamily="34" charset="0"/>
-              <a:buChar char="•"/>
-            </a:pPr>
-            <a:r>
-              <a:rPr lang="en-US" sz="1200" b="1" i="0" dirty="0">
+              <a:rPr lang="en-US" sz="1200" b="0" i="0" dirty="0">
                 <a:solidFill>
                   <a:srgbClr val="333333"/>
                 </a:solidFill>
                 <a:effectLst/>
                 <a:latin typeface="Helvetica Neue" panose="02000503000000020004" pitchFamily="2" charset="0"/>
               </a:rPr>
-              <a:t>mechanisms to promote efficient learning</a:t>
-            </a:r>
-            <a:r>
-              <a:rPr lang="en-US" sz="1200" b="0" i="0" dirty="0">
+              <a:t>Related Papers &amp; Acknowledgement:</a:t>
+            </a:r>
+            <a:endParaRPr lang="en-US" sz="1000" dirty="0">
+              <a:solidFill>
+                <a:srgbClr val="333333"/>
+              </a:solidFill>
+              <a:latin typeface="Helvetica Neue" panose="02000503000000020004" pitchFamily="2" charset="0"/>
+            </a:endParaRPr>
+          </a:p>
+          <a:p>
+            <a:pPr marL="0" indent="0" algn="l">
+              <a:buNone/>
+            </a:pPr>
+            <a:r>
+              <a:rPr lang="en-US" sz="900" dirty="0">
+                <a:solidFill>
+                  <a:srgbClr val="333333"/>
+                </a:solidFill>
+                <a:latin typeface="Helvetica Neue" panose="02000503000000020004" pitchFamily="2" charset="0"/>
+              </a:rPr>
+              <a:t>Li, Z., Lloyd, S., Beckman, M. D., &amp; </a:t>
+            </a:r>
+            <a:r>
+              <a:rPr lang="en-US" sz="900" dirty="0" err="1">
+                <a:solidFill>
+                  <a:srgbClr val="333333"/>
+                </a:solidFill>
+                <a:latin typeface="Helvetica Neue" panose="02000503000000020004" pitchFamily="2" charset="0"/>
+              </a:rPr>
+              <a:t>Passonneau</a:t>
+            </a:r>
+            <a:r>
+              <a:rPr lang="en-US" sz="900" dirty="0">
+                <a:solidFill>
+                  <a:srgbClr val="333333"/>
+                </a:solidFill>
+                <a:latin typeface="Helvetica Neue" panose="02000503000000020004" pitchFamily="2" charset="0"/>
+              </a:rPr>
+              <a:t>, R. J. (2023). Answer-state Recurrent Relational Network (</a:t>
+            </a:r>
+            <a:r>
+              <a:rPr lang="en-US" sz="900" dirty="0" err="1">
+                <a:solidFill>
+                  <a:srgbClr val="333333"/>
+                </a:solidFill>
+                <a:latin typeface="Helvetica Neue" panose="02000503000000020004" pitchFamily="2" charset="0"/>
+              </a:rPr>
+              <a:t>AsRRN</a:t>
+            </a:r>
+            <a:r>
+              <a:rPr lang="en-US" sz="900" dirty="0">
+                <a:solidFill>
+                  <a:srgbClr val="333333"/>
+                </a:solidFill>
+                <a:latin typeface="Helvetica Neue" panose="02000503000000020004" pitchFamily="2" charset="0"/>
+              </a:rPr>
+              <a:t>) for Constructed Response Assessment and Feedback Grouping. *Findings of the Conference on Empirical Methods in Natural Language Processing (EMNLP) 2023*.  </a:t>
+            </a:r>
+            <a:r>
+              <a:rPr lang="en-US" sz="900" dirty="0">
+                <a:solidFill>
+                  <a:srgbClr val="333333"/>
+                </a:solidFill>
+                <a:latin typeface="Helvetica Neue" panose="02000503000000020004" pitchFamily="2" charset="0"/>
+                <a:hlinkClick r:id="rId3"/>
+              </a:rPr>
+              <a:t>https://doi.org/10.18653/v1/2023.findings-emnlp.254</a:t>
+            </a:r>
+            <a:r>
+              <a:rPr lang="en-US" sz="900" dirty="0">
+                <a:solidFill>
+                  <a:srgbClr val="333333"/>
+                </a:solidFill>
+                <a:latin typeface="Helvetica Neue" panose="02000503000000020004" pitchFamily="2" charset="0"/>
+              </a:rPr>
+              <a:t> </a:t>
+            </a:r>
+            <a:endParaRPr lang="en-US" sz="900" b="0" i="0" dirty="0">
+              <a:solidFill>
+                <a:srgbClr val="333333"/>
+              </a:solidFill>
+              <a:effectLst/>
+              <a:latin typeface="Helvetica Neue" panose="02000503000000020004" pitchFamily="2" charset="0"/>
+            </a:endParaRPr>
+          </a:p>
+          <a:p>
+            <a:pPr marL="0" indent="0" algn="l">
+              <a:buNone/>
+            </a:pPr>
+            <a:r>
+              <a:rPr lang="en-US" sz="900" b="0" i="0" dirty="0">
                 <a:solidFill>
                   <a:srgbClr val="333333"/>
                 </a:solidFill>
                 <a:effectLst/>
                 <a:latin typeface="Helvetica Neue" panose="02000503000000020004" pitchFamily="2" charset="0"/>
               </a:rPr>
-              <a:t> outcomes</a:t>
-            </a:r>
-          </a:p>
-          <a:p>
-            <a:pPr algn="l">
-              <a:buFont typeface="Arial" panose="020B0604020202020204" pitchFamily="34" charset="0"/>
-              <a:buChar char="•"/>
-            </a:pPr>
-            <a:r>
-              <a:rPr lang="en-US" sz="1200" b="0" i="0" dirty="0">
+              <a:t>Lloyd, S. E., Beckman, M., Pearl, D., </a:t>
+            </a:r>
+            <a:r>
+              <a:rPr lang="en-US" sz="900" b="0" i="0" dirty="0" err="1">
                 <a:solidFill>
                   <a:srgbClr val="333333"/>
                 </a:solidFill>
                 <a:effectLst/>
                 <a:latin typeface="Helvetica Neue" panose="02000503000000020004" pitchFamily="2" charset="0"/>
               </a:rPr>
-              <a:t>cognitive transfer, i.e., flexible/portable learning to be applied beyond the classroom</a:t>
-            </a:r>
-          </a:p>
-          <a:p>
-            <a:pPr algn="l">
-              <a:buFont typeface="Arial" panose="020B0604020202020204" pitchFamily="34" charset="0"/>
-              <a:buChar char="•"/>
-            </a:pPr>
-            <a:r>
-              <a:rPr lang="en-US" sz="1200" b="0" i="0" dirty="0">
+              <a:t>Passonneau</a:t>
+            </a:r>
+            <a:r>
+              <a:rPr lang="en-US" sz="900" b="0" i="0" dirty="0">
                 <a:solidFill>
                   <a:srgbClr val="333333"/>
                 </a:solidFill>
                 <a:effectLst/>
                 <a:latin typeface="Helvetica Neue" panose="02000503000000020004" pitchFamily="2" charset="0"/>
               </a:rPr>
-              <a:t>cognitive load, i.e., stresses on student bandwidth during learning processes</a:t>
+              <a:t>, R., Li, Z., &amp; Wang, Z. (2022). Foundations for AI-Assisted Formative Assessment Feedback for Short-Answer Tasks in Large-Enrollment Classes. In </a:t>
+            </a:r>
+            <a:r>
+              <a:rPr lang="en-US" sz="900" b="0" i="1" dirty="0">
+                <a:solidFill>
+                  <a:srgbClr val="333333"/>
+                </a:solidFill>
+                <a:effectLst/>
+                <a:latin typeface="Helvetica Neue" panose="02000503000000020004" pitchFamily="2" charset="0"/>
+              </a:rPr>
+              <a:t>Proceedings of the eleventh international conference on teaching statistics</a:t>
+            </a:r>
+            <a:r>
+              <a:rPr lang="en-US" sz="900" b="0" i="0" dirty="0">
+                <a:solidFill>
+                  <a:srgbClr val="333333"/>
+                </a:solidFill>
+                <a:effectLst/>
+                <a:latin typeface="Helvetica Neue" panose="02000503000000020004" pitchFamily="2" charset="0"/>
+              </a:rPr>
+              <a:t>. Rosario, Argentina.</a:t>
             </a:r>
           </a:p>
           <a:p>
@@ -2648,55 +2752,21 @@
               <a:buNone/>
             </a:pPr>
             <a:r>
-              <a:rPr lang="en-US" sz="1000" b="0" i="0" dirty="0">
+              <a:rPr lang="en-US" sz="1100" dirty="0">
                 <a:solidFill>
                   <a:srgbClr val="333333"/>
                 </a:solidFill>
-                <a:effectLst/>
                 <a:latin typeface="Helvetica Neue" panose="02000503000000020004" pitchFamily="2" charset="0"/>
               </a:rPr>
-              <a:t>Beckman, M. D., &amp; </a:t>
-            </a:r>
-            <a:r>
-              <a:rPr lang="en-US" sz="1000" b="0" i="0" dirty="0" err="1">
-                <a:solidFill>
-                  <a:srgbClr val="333333"/>
-                </a:solidFill>
-                <a:effectLst/>
-                <a:latin typeface="Helvetica Neue" panose="02000503000000020004" pitchFamily="2" charset="0"/>
-              </a:rPr>
-              <a:t>delMas</a:t>
-            </a:r>
-            <a:r>
-              <a:rPr lang="en-US" sz="1000" b="0" i="0" dirty="0">
-                <a:solidFill>
-                  <a:srgbClr val="333333"/>
-                </a:solidFill>
-                <a:effectLst/>
-                <a:latin typeface="Helvetica Neue" panose="02000503000000020004" pitchFamily="2" charset="0"/>
-              </a:rPr>
-              <a:t>, R. C. (2018). Statistics students’ identification of inferential model elements within contexts of their own invention. </a:t>
-            </a:r>
-            <a:r>
-              <a:rPr lang="en-US" sz="1000" b="0" i="1" dirty="0">
-                <a:solidFill>
-                  <a:srgbClr val="333333"/>
-                </a:solidFill>
-                <a:effectLst/>
-                <a:latin typeface="Helvetica Neue" panose="02000503000000020004" pitchFamily="2" charset="0"/>
-              </a:rPr>
-              <a:t>ZDM Mathematics Education 50</a:t>
-            </a:r>
-            <a:r>
-              <a:rPr lang="en-US" sz="1000" b="0" i="0" dirty="0">
-                <a:solidFill>
-                  <a:srgbClr val="333333"/>
-                </a:solidFill>
-                <a:effectLst/>
-                <a:latin typeface="Helvetica Neue" panose="02000503000000020004" pitchFamily="2" charset="0"/>
-              </a:rPr>
-              <a:t>(7). DOI: 10.1007/s11858-018-0986-5</a:t>
-            </a:r>
+              <a:t>           NSF Award #2236150 (Project CLASSIFIES)</a:t>
+            </a:r>
+            <a:endParaRPr lang="en-US" sz="1300" b="0" i="0" dirty="0">
+              <a:solidFill>
+                <a:srgbClr val="333333"/>
+              </a:solidFill>
+              <a:effectLst/>
+              <a:latin typeface="Helvetica Neue" panose="02000503000000020004" pitchFamily="2" charset="0"/>
+            </a:endParaRPr>
           </a:p>
           <a:p>
             <a:pPr marL="0" indent="0" algn="l">
@@ -2706,196 +2776,6 @@
               <a:solidFill>
                 <a:schemeClr val="accent2"/>
               </a:solidFill>
-            </a:endParaRPr>
-          </a:p>
-          <a:p>
-            <a:pPr marL="0" indent="0">
-              <a:buNone/>
-            </a:pPr>
-            <a:r>
-              <a:rPr lang="en-US" sz="2000" b="1" dirty="0">
-                <a:solidFill>
-                  <a:schemeClr val="accent2"/>
-                </a:solidFill>
-              </a:rPr>
-              <a:t>Data Sciences Education</a:t>
-            </a:r>
-          </a:p>
-          <a:p>
-            <a:pPr algn="l">
-              <a:buFont typeface="Arial" panose="020B0604020202020204" pitchFamily="34" charset="0"/>
-              <a:buChar char="•"/>
-            </a:pPr>
-            <a:r>
-              <a:rPr lang="en-US" sz="1200" b="0" i="0" dirty="0">
-                <a:solidFill>
-                  <a:srgbClr val="333333"/>
-                </a:solidFill>
-                <a:effectLst/>
-                <a:latin typeface="Helvetica Neue" panose="02000503000000020004" pitchFamily="2" charset="0"/>
-              </a:rPr>
-              <a:t>exploring intersection of stat education &amp; computing education</a:t>
-            </a:r>
-          </a:p>
-          <a:p>
-            <a:pPr algn="l">
-              <a:buFont typeface="Arial" panose="020B0604020202020204" pitchFamily="34" charset="0"/>
-              <a:buChar char="•"/>
-            </a:pPr>
-            <a:r>
-              <a:rPr lang="en-US" sz="1200" b="0" i="0" dirty="0">
-                <a:solidFill>
-                  <a:srgbClr val="333333"/>
-                </a:solidFill>
-                <a:effectLst/>
-                <a:latin typeface="Helvetica Neue" panose="02000503000000020004" pitchFamily="2" charset="0"/>
-              </a:rPr>
-              <a:t>studying </a:t>
-            </a:r>
-            <a:r>
-              <a:rPr lang="en-US" sz="1200" b="1" i="0" dirty="0">
-                <a:solidFill>
-                  <a:srgbClr val="333333"/>
-                </a:solidFill>
-                <a:effectLst/>
-                <a:latin typeface="Helvetica Neue" panose="02000503000000020004" pitchFamily="2" charset="0"/>
-              </a:rPr>
-              <a:t>DS/CS topics introduced as learning objectives in statistics</a:t>
-            </a:r>
-            <a:r>
-              <a:rPr lang="en-US" sz="1200" b="0" i="0" dirty="0">
-                <a:solidFill>
-                  <a:srgbClr val="333333"/>
-                </a:solidFill>
-                <a:effectLst/>
-                <a:latin typeface="Helvetica Neue" panose="02000503000000020004" pitchFamily="2" charset="0"/>
-              </a:rPr>
-              <a:t> curricula</a:t>
-            </a:r>
-          </a:p>
-          <a:p>
-            <a:pPr algn="l">
-              <a:buFont typeface="Arial" panose="020B0604020202020204" pitchFamily="34" charset="0"/>
-              <a:buChar char="•"/>
-            </a:pPr>
-            <a:r>
-              <a:rPr lang="en-US" sz="1200" dirty="0">
-                <a:solidFill>
-                  <a:srgbClr val="333333"/>
-                </a:solidFill>
-                <a:latin typeface="Helvetica Neue" panose="02000503000000020004" pitchFamily="2" charset="0"/>
-              </a:rPr>
-              <a:t>d</a:t>
-            </a:r>
-            <a:r>
-              <a:rPr lang="en-US" sz="1200" b="0" i="0" dirty="0">
-                <a:solidFill>
-                  <a:srgbClr val="333333"/>
-                </a:solidFill>
-                <a:effectLst/>
-                <a:latin typeface="Helvetica Neue" panose="02000503000000020004" pitchFamily="2" charset="0"/>
-              </a:rPr>
-              <a:t>ata literacy, data acumen, EDA for DS</a:t>
-            </a:r>
-            <a:endParaRPr lang="en-US" sz="1000" b="0" i="0" dirty="0">
-              <a:solidFill>
-                <a:srgbClr val="333333"/>
-              </a:solidFill>
-              <a:effectLst/>
-              <a:latin typeface="Helvetica Neue" panose="02000503000000020004" pitchFamily="2" charset="0"/>
-            </a:endParaRPr>
-          </a:p>
-          <a:p>
-            <a:pPr marL="0" indent="0" algn="l">
-              <a:buNone/>
-            </a:pPr>
-            <a:r>
-              <a:rPr lang="en-US" sz="1000" b="0" i="0" dirty="0">
-                <a:solidFill>
-                  <a:srgbClr val="333333"/>
-                </a:solidFill>
-                <a:effectLst/>
-                <a:latin typeface="Helvetica Neue" panose="02000503000000020004" pitchFamily="2" charset="0"/>
-              </a:rPr>
-              <a:t>Beckman, M. D., Cetinkaya-</a:t>
-            </a:r>
-            <a:r>
-              <a:rPr lang="en-US" sz="1000" b="0" i="0" dirty="0" err="1">
-                <a:solidFill>
-                  <a:srgbClr val="333333"/>
-                </a:solidFill>
-                <a:effectLst/>
-                <a:latin typeface="Helvetica Neue" panose="02000503000000020004" pitchFamily="2" charset="0"/>
-              </a:rPr>
-              <a:t>Rundel</a:t>
-            </a:r>
-            <a:r>
-              <a:rPr lang="en-US" sz="1000" b="0" i="0" dirty="0">
-                <a:solidFill>
-                  <a:srgbClr val="333333"/>
-                </a:solidFill>
-                <a:effectLst/>
-                <a:latin typeface="Helvetica Neue" panose="02000503000000020004" pitchFamily="2" charset="0"/>
-              </a:rPr>
-              <a:t>, M., Horton, N. J., </a:t>
-            </a:r>
-            <a:r>
-              <a:rPr lang="en-US" sz="1000" b="0" i="0" dirty="0" err="1">
-                <a:solidFill>
-                  <a:srgbClr val="333333"/>
-                </a:solidFill>
-                <a:effectLst/>
-                <a:latin typeface="Helvetica Neue" panose="02000503000000020004" pitchFamily="2" charset="0"/>
-              </a:rPr>
-              <a:t>Rundel</a:t>
-            </a:r>
-            <a:r>
-              <a:rPr lang="en-US" sz="1000" b="0" i="0" dirty="0">
-                <a:solidFill>
-                  <a:srgbClr val="333333"/>
-                </a:solidFill>
-                <a:effectLst/>
-                <a:latin typeface="Helvetica Neue" panose="02000503000000020004" pitchFamily="2" charset="0"/>
-              </a:rPr>
-              <a:t>, C. W., Sullivan, A. J., &amp; Tackett, M. (2021). Implementing Version Control With Git and GitHub as a Learning Objective in Statistics and Data Science Courses. </a:t>
-            </a:r>
-            <a:r>
-              <a:rPr lang="en-US" sz="1000" b="0" i="1" dirty="0">
-                <a:solidFill>
-                  <a:srgbClr val="333333"/>
-                </a:solidFill>
-                <a:effectLst/>
-                <a:latin typeface="Helvetica Neue" panose="02000503000000020004" pitchFamily="2" charset="0"/>
-              </a:rPr>
-              <a:t>Journal of Statistics and Data Science Education, 29</a:t>
-            </a:r>
-            <a:r>
-              <a:rPr lang="en-US" sz="1000" b="0" i="0" dirty="0">
-                <a:solidFill>
-                  <a:srgbClr val="333333"/>
-                </a:solidFill>
-                <a:effectLst/>
-                <a:latin typeface="Helvetica Neue" panose="02000503000000020004" pitchFamily="2" charset="0"/>
-              </a:rPr>
-              <a:t>(1). </a:t>
-            </a:r>
-            <a:r>
-              <a:rPr lang="en-US" sz="1000" b="0" i="0" u="none" strike="noStrike" dirty="0">
-                <a:solidFill>
-                  <a:srgbClr val="337AB7"/>
-                </a:solidFill>
-                <a:effectLst/>
-                <a:latin typeface="Helvetica Neue" panose="02000503000000020004" pitchFamily="2" charset="0"/>
-                <a:hlinkClick r:id="rId3"/>
-              </a:rPr>
-              <a:t>https://doi.org/10.1080/10691898.2020.1848485</a:t>
-            </a:r>
-            <a:endParaRPr lang="en-US" sz="1000" b="0" i="0" dirty="0">
-              <a:solidFill>
-                <a:srgbClr val="333333"/>
-              </a:solidFill>
-              <a:effectLst/>
-              <a:latin typeface="Helvetica Neue" panose="02000503000000020004" pitchFamily="2" charset="0"/>
             </a:endParaRPr>
           </a:p>
         </p:txBody>
@@ -2914,7 +2794,7 @@
         </p:nvSpPr>
         <p:spPr>
           <a:xfrm>
-            <a:off x="9416192" y="3794230"/>
+            <a:off x="9416191" y="4122221"/>
             <a:ext cx="2542145" cy="1369606"/>
           </a:xfrm>
           <a:prstGeom prst="rect">
@@ -3011,8 +2891,8 @@
         </p:nvSpPr>
         <p:spPr>
           <a:xfrm>
-            <a:off x="4484758" y="255494"/>
-            <a:ext cx="4809074" cy="5715000"/>
+            <a:off x="4910763" y="272204"/>
+            <a:ext cx="4135423" cy="5568836"/>
           </a:xfrm>
           <a:prstGeom prst="rect">
             <a:avLst/>
@@ -3026,7 +2906,7 @@
         </p:spPr>
         <p:txBody>
           <a:bodyPr vert="horz" lIns="91440" tIns="45720" rIns="91440" bIns="45720" rtlCol="0">
-            <a:normAutofit/>
+            <a:normAutofit fontScale="92500" lnSpcReduction="10000"/>
           </a:bodyPr>
           <a:lstStyle>
             <a:lvl1pPr marL="228600" indent="-228600" algn="l" defTabSz="914400" rtl="0" eaLnBrk="1" latinLnBrk="0" hangingPunct="1">
@@ -3231,13 +3111,100 @@
               <a:buNone/>
             </a:pPr>
             <a:r>
-              <a:rPr lang="en-US" sz="2400" dirty="0">
-                <a:solidFill>
-                  <a:schemeClr val="bg1"/>
+              <a:rPr lang="en-US" sz="2000" dirty="0">
+                <a:solidFill>
+                  <a:schemeClr val="accent2"/>
                 </a:solidFill>
                 <a:latin typeface="+mj-lt"/>
               </a:rPr>
               <a:t>Statistics &amp; Data Science Education (SDSE) Research</a:t>
+            </a:r>
+          </a:p>
+          <a:p>
+            <a:pPr marL="0" indent="0" algn="ctr">
+              <a:lnSpc>
+                <a:spcPct val="150000"/>
+              </a:lnSpc>
+              <a:spcBef>
+                <a:spcPts val="1600"/>
+              </a:spcBef>
+              <a:spcAft>
+                <a:spcPts val="1800"/>
+              </a:spcAft>
+              <a:buFont typeface="Arial" panose="020B0604020202020204" pitchFamily="34" charset="0"/>
+              <a:buNone/>
+            </a:pPr>
+            <a:endParaRPr lang="en-US" sz="2400" dirty="0">
+              <a:solidFill>
+                <a:schemeClr val="bg1"/>
+              </a:solidFill>
+              <a:latin typeface="+mj-lt"/>
+            </a:endParaRPr>
+          </a:p>
+          <a:p>
+            <a:pPr marL="0" indent="0" algn="ctr">
+              <a:lnSpc>
+                <a:spcPct val="150000"/>
+              </a:lnSpc>
+              <a:spcBef>
+                <a:spcPts val="1600"/>
+              </a:spcBef>
+              <a:spcAft>
+                <a:spcPts val="1800"/>
+              </a:spcAft>
+              <a:buFont typeface="Arial" panose="020B0604020202020204" pitchFamily="34" charset="0"/>
+              <a:buNone/>
+            </a:pPr>
+            <a:endParaRPr lang="en-US" sz="2400" dirty="0">
+              <a:solidFill>
+                <a:schemeClr val="bg1"/>
+              </a:solidFill>
+              <a:latin typeface="+mj-lt"/>
+            </a:endParaRPr>
+          </a:p>
+          <a:p>
+            <a:pPr marL="0" indent="0" algn="ctr">
+              <a:lnSpc>
+                <a:spcPct val="150000"/>
+              </a:lnSpc>
+              <a:spcBef>
+                <a:spcPts val="1600"/>
+              </a:spcBef>
+              <a:spcAft>
+                <a:spcPts val="1800"/>
+              </a:spcAft>
+              <a:buFont typeface="Arial" panose="020B0604020202020204" pitchFamily="34" charset="0"/>
+              <a:buNone/>
+            </a:pPr>
+            <a:endParaRPr lang="en-US" sz="2400" dirty="0">
+              <a:solidFill>
+                <a:schemeClr val="bg1"/>
+              </a:solidFill>
+              <a:latin typeface="+mj-lt"/>
+            </a:endParaRPr>
+          </a:p>
+          <a:p>
+            <a:pPr marL="0" indent="0" algn="ctr">
+              <a:lnSpc>
+                <a:spcPct val="150000"/>
+              </a:lnSpc>
+              <a:spcBef>
+                <a:spcPts val="1600"/>
+              </a:spcBef>
+              <a:spcAft>
+                <a:spcPts val="1800"/>
+              </a:spcAft>
+              <a:buFont typeface="Arial" panose="020B0604020202020204" pitchFamily="34" charset="0"/>
+              <a:buNone/>
+            </a:pPr>
+            <a:r>
+              <a:rPr lang="en-US" sz="2400" dirty="0">
+                <a:solidFill>
+                  <a:schemeClr val="bg1"/>
+                </a:solidFill>
+                <a:latin typeface="+mj-lt"/>
+              </a:rPr>
+              <a:t>^^ 20 Second Survey ^^ </a:t>
             </a:r>
           </a:p>
         </p:txBody>
@@ -3256,8 +3223,8 @@
         </p:nvSpPr>
         <p:spPr>
           <a:xfrm>
-            <a:off x="9293832" y="255494"/>
-            <a:ext cx="2786866" cy="2945678"/>
+            <a:off x="9140776" y="255494"/>
+            <a:ext cx="2939922" cy="2554545"/>
           </a:xfrm>
           <a:prstGeom prst="rect">
             <a:avLst/>
@@ -3318,7 +3285,7 @@
                 </a:solidFill>
                 <a:latin typeface="Helvetica Neue" panose="02000503000000020004" pitchFamily="2" charset="0"/>
               </a:rPr>
-              <a:t>SDSE Research Lab—Spring 23 </a:t>
+              <a:t>SDSE Research Lab—Spring 24 </a:t>
             </a:r>
             <a:r>
               <a:rPr lang="en-US" sz="1250" b="1" dirty="0">
@@ -3327,7 +3294,7 @@
                 </a:solidFill>
                 <a:latin typeface="Helvetica Neue" panose="02000503000000020004" pitchFamily="2" charset="0"/>
               </a:rPr>
-              <a:t>Wed @ 9am in 421 Thomas </a:t>
+              <a:t>Wed @ 4pm in 421 Thomas </a:t>
             </a:r>
             <a:r>
               <a:rPr lang="en-US" sz="1250" b="1" dirty="0" err="1">
@@ -3363,16 +3330,7 @@
                 </a:solidFill>
                 <a:latin typeface="Helvetica Neue" panose="02000503000000020004" pitchFamily="2" charset="0"/>
               </a:rPr>
-              <a:t>CAUSE Research Satellite @ USCOTS—national SDSE conference at </a:t>
-            </a:r>
-            <a:r>
-              <a:rPr lang="en-US" sz="1250" b="1" dirty="0">
-                <a:solidFill>
-                  <a:srgbClr val="333333"/>
-                </a:solidFill>
-                <a:latin typeface="Helvetica Neue" panose="02000503000000020004" pitchFamily="2" charset="0"/>
-              </a:rPr>
-              <a:t>Penn Stater Conference Center (5/31 to 6/1)</a:t>
+              <a:t>JSM Sessions</a:t>
             </a:r>
           </a:p>
           <a:p>
@@ -3387,14 +3345,29 @@
               <a:buChar char="•"/>
             </a:pPr>
             <a:r>
-              <a:rPr lang="en-US" sz="1250" dirty="0">
+              <a:rPr lang="en-US" sz="1250" dirty="0" err="1">
                 <a:solidFill>
                   <a:srgbClr val="333333"/>
                 </a:solidFill>
                 <a:latin typeface="Helvetica Neue" panose="02000503000000020004" pitchFamily="2" charset="0"/>
               </a:rPr>
-              <a:t>IASE catalog of PhD dissertations in statistics education</a:t>
-            </a:r>
+              <a:t>eCOTS</a:t>
+            </a:r>
+            <a:r>
+              <a:rPr lang="en-US" sz="1250" dirty="0">
+                <a:solidFill>
+                  <a:srgbClr val="333333"/>
+                </a:solidFill>
+                <a:latin typeface="Helvetica Neue" panose="02000503000000020004" pitchFamily="2" charset="0"/>
+              </a:rPr>
+              <a:t> Conference</a:t>
+            </a:r>
+            <a:endParaRPr lang="en-US" sz="1250" b="1" dirty="0">
+              <a:solidFill>
+                <a:srgbClr val="333333"/>
+              </a:solidFill>
+              <a:latin typeface="Helvetica Neue" panose="02000503000000020004" pitchFamily="2" charset="0"/>
+            </a:endParaRPr>
           </a:p>
           <a:p>
             <a:pPr marL="171450" indent="-171450">
@@ -3414,8 +3387,20 @@
                 </a:solidFill>
                 <a:latin typeface="Helvetica Neue" panose="02000503000000020004" pitchFamily="2" charset="0"/>
               </a:rPr>
-              <a:t>Take a photo of QR code below, email me, drop by my office, </a:t>
-            </a:r>
+              <a:t>IASE catalog of PhD dissertations in statistics education</a:t>
+            </a:r>
+          </a:p>
+          <a:p>
+            <a:pPr marL="171450" indent="-171450">
+              <a:lnSpc>
+                <a:spcPct val="90000"/>
+              </a:lnSpc>
+              <a:spcBef>
+                <a:spcPts val="1000"/>
+              </a:spcBef>
+              <a:buFont typeface="Arial" panose="020B0604020202020204" pitchFamily="34" charset="0"/>
+              <a:buChar char="•"/>
+            </a:pPr>
             <a:r>
               <a:rPr lang="en-US" sz="1250" dirty="0" err="1">
                 <a:solidFill>
@@ -3423,7 +3408,7 @@
                 </a:solidFill>
                 <a:latin typeface="Helvetica Neue" panose="02000503000000020004" pitchFamily="2" charset="0"/>
               </a:rPr>
-              <a:t>etc</a:t>
+              <a:t>causeweb.org</a:t>
             </a:r>
             <a:endParaRPr lang="en-US" sz="1250" dirty="0">
               <a:solidFill>
@@ -3434,41 +3419,6 @@
           </a:p>
         </p:txBody>
       </p:sp>
-      <p:pic>
-        <p:nvPicPr>
-          <p:cNvPr id="9" name="Picture 8" descr="Qr code&#10;&#10;Description automatically generated">
-            <a:extLst>
-              <a:ext uri="{FF2B5EF4-FFF2-40B4-BE49-F238E27FC236}">
-                <a16:creationId xmlns:a16="http://schemas.microsoft.com/office/drawing/2014/main" id="{84188A29-F190-A30B-32AA-A95BC06EFF9E}"/>
-              </a:ext>
-            </a:extLst>
-          </p:cNvPr>
-          <p:cNvPicPr>
-            <a:picLocks noChangeAspect="1"/>
-          </p:cNvPicPr>
-          <p:nvPr/>
-        </p:nvPicPr>
-        <p:blipFill rotWithShape="1">
-          <a:blip r:embed="rId4">
-            <a:extLst>
-              <a:ext uri="{28A0092B-C50C-407E-A947-70E740481C1C}">
-                <a14:useLocalDpi xmlns:a14="http://schemas.microsoft.com/office/drawing/2010/main" val="0"/>
-              </a:ext>
-            </a:extLst>
-          </a:blip>
-          <a:srcRect l="8944" t="9471" r="10453" b="9019"/>
-          <a:stretch/>
-        </p:blipFill>
-        <p:spPr>
-          <a:xfrm>
-            <a:off x="5763419" y="2886785"/>
-            <a:ext cx="2251751" cy="2277051"/>
-          </a:xfrm>
-          <a:prstGeom prst="rect">
-            <a:avLst/>
-          </a:prstGeom>
-        </p:spPr>
-      </p:pic>
       <p:sp>
         <p:nvSpPr>
           <p:cNvPr id="13" name="TextBox 12">
@@ -3483,7 +3433,7 @@
         </p:nvSpPr>
         <p:spPr>
           <a:xfrm>
-            <a:off x="4484757" y="5413276"/>
+            <a:off x="3438434" y="6517286"/>
             <a:ext cx="4809074" cy="307777"/>
           </a:xfrm>
           <a:prstGeom prst="rect">
@@ -3497,25 +3447,137 @@
           </a:bodyPr>
           <a:lstStyle/>
           <a:p>
-            <a:pPr algn="ctr"/>
-            <a:r>
-              <a:rPr lang="en-US" sz="1400" b="1" i="0" dirty="0">
+            <a:r>
+              <a:rPr lang="en-US" sz="1400" b="1" i="0" dirty="0" err="1">
                 <a:solidFill>
                   <a:schemeClr val="accent2"/>
                 </a:solidFill>
                 <a:effectLst/>
                 <a:latin typeface="Helvetica Neue" panose="02000503000000020004" pitchFamily="2" charset="0"/>
               </a:rPr>
-              <a:t>mdbeckman.github.io/2023-PSU-Stat-Research-Day</a:t>
-            </a:r>
-            <a:endParaRPr lang="en-US" sz="1400" b="1" dirty="0">
-              <a:solidFill>
-                <a:schemeClr val="accent2"/>
-              </a:solidFill>
-            </a:endParaRPr>
+              <a:t>mdbeckman.github.io</a:t>
+            </a:r>
+            <a:r>
+              <a:rPr lang="en-US" sz="1400" b="1" i="0" dirty="0">
+                <a:solidFill>
+                  <a:schemeClr val="accent2"/>
+                </a:solidFill>
+                <a:effectLst/>
+                <a:latin typeface="Helvetica Neue" panose="02000503000000020004" pitchFamily="2" charset="0"/>
+              </a:rPr>
+              <a:t>/2024-PSU-Stat-Research-Day</a:t>
+            </a:r>
           </a:p>
         </p:txBody>
       </p:sp>
+      <p:pic>
+        <p:nvPicPr>
+          <p:cNvPr id="7" name="Picture 6" descr="A qr code on a white background&#10;&#10;Description automatically generated">
+            <a:extLst>
+              <a:ext uri="{FF2B5EF4-FFF2-40B4-BE49-F238E27FC236}">
+                <a16:creationId xmlns:a16="http://schemas.microsoft.com/office/drawing/2014/main" id="{E72D9DA3-15E3-D7F0-7A9A-8B2236DC4FF1}"/>
+              </a:ext>
+            </a:extLst>
+          </p:cNvPr>
+          <p:cNvPicPr>
+            <a:picLocks noChangeAspect="1"/>
+          </p:cNvPicPr>
+          <p:nvPr/>
+        </p:nvPicPr>
+        <p:blipFill>
+          <a:blip r:embed="rId4">
+            <a:extLst>
+              <a:ext uri="{28A0092B-C50C-407E-A947-70E740481C1C}">
+                <a14:useLocalDpi xmlns:a14="http://schemas.microsoft.com/office/drawing/2010/main" val="0"/>
+              </a:ext>
+            </a:extLst>
+          </a:blip>
+          <a:stretch>
+            <a:fillRect/>
+          </a:stretch>
+        </p:blipFill>
+        <p:spPr>
+          <a:xfrm>
+            <a:off x="5775799" y="2269239"/>
+            <a:ext cx="2471709" cy="2471709"/>
+          </a:xfrm>
+          <a:prstGeom prst="rect">
+            <a:avLst/>
+          </a:prstGeom>
+        </p:spPr>
+      </p:pic>
+      <p:pic>
+        <p:nvPicPr>
+          <p:cNvPr id="10" name="Picture 9" descr="A diagram of a software program&#10;&#10;Description automatically generated">
+            <a:extLst>
+              <a:ext uri="{FF2B5EF4-FFF2-40B4-BE49-F238E27FC236}">
+                <a16:creationId xmlns:a16="http://schemas.microsoft.com/office/drawing/2014/main" id="{A33F9D9B-D4B9-32A8-F0BF-9554A66C5330}"/>
+              </a:ext>
+            </a:extLst>
+          </p:cNvPr>
+          <p:cNvPicPr>
+            <a:picLocks noChangeAspect="1"/>
+          </p:cNvPicPr>
+          <p:nvPr/>
+        </p:nvPicPr>
+        <p:blipFill>
+          <a:blip r:embed="rId5">
+            <a:extLst>
+              <a:ext uri="{28A0092B-C50C-407E-A947-70E740481C1C}">
+                <a14:useLocalDpi xmlns:a14="http://schemas.microsoft.com/office/drawing/2010/main" val="0"/>
+              </a:ext>
+            </a:extLst>
+          </a:blip>
+          <a:stretch>
+            <a:fillRect/>
+          </a:stretch>
+        </p:blipFill>
+        <p:spPr>
+          <a:xfrm>
+            <a:off x="38945" y="1532766"/>
+            <a:ext cx="4871817" cy="2681425"/>
+          </a:xfrm>
+          <a:prstGeom prst="rect">
+            <a:avLst/>
+          </a:prstGeom>
+        </p:spPr>
+      </p:pic>
+      <p:pic>
+        <p:nvPicPr>
+          <p:cNvPr id="12" name="Picture 11" descr="A logo of a globe with a gold cogwheel&#10;&#10;Description automatically generated">
+            <a:extLst>
+              <a:ext uri="{FF2B5EF4-FFF2-40B4-BE49-F238E27FC236}">
+                <a16:creationId xmlns:a16="http://schemas.microsoft.com/office/drawing/2014/main" id="{68747CA0-270C-1B00-05B3-6C1055FF0774}"/>
+              </a:ext>
+            </a:extLst>
+          </p:cNvPr>
+          <p:cNvPicPr>
+            <a:picLocks noChangeAspect="1"/>
+          </p:cNvPicPr>
+          <p:nvPr/>
+        </p:nvPicPr>
+        <p:blipFill>
+          <a:blip r:embed="rId6">
+            <a:extLst>
+              <a:ext uri="{28A0092B-C50C-407E-A947-70E740481C1C}">
+                <a14:useLocalDpi xmlns:a14="http://schemas.microsoft.com/office/drawing/2010/main" val="0"/>
+              </a:ext>
+            </a:extLst>
+          </a:blip>
+          <a:stretch>
+            <a:fillRect/>
+          </a:stretch>
+        </p:blipFill>
+        <p:spPr>
+          <a:xfrm>
+            <a:off x="111302" y="6430618"/>
+            <a:ext cx="427382" cy="427382"/>
+          </a:xfrm>
+          <a:prstGeom prst="rect">
+            <a:avLst/>
+          </a:prstGeom>
+        </p:spPr>
+      </p:pic>
     </p:spTree>
     <p:extLst>
       <p:ext uri="{BB962C8B-B14F-4D97-AF65-F5344CB8AC3E}">
@@ -4086,6 +4148,21 @@
 </file>
 
 <file path=customXml/item1.xml><?xml version="1.0" encoding="utf-8"?>
+<p:properties xmlns:p="http://schemas.microsoft.com/office/2006/metadata/properties" xmlns:xsi="http://www.w3.org/2001/XMLSchema-instance" xmlns:pc="http://schemas.microsoft.com/office/infopath/2007/PartnerControls">
+  <documentManagement/>
+</p:properties>
+</file>
+
+<file path=customXml/item2.xml><?xml version="1.0" encoding="utf-8"?>
+<?mso-contentType ?>
+<FormTemplates xmlns="http://schemas.microsoft.com/sharepoint/v3/contenttype/forms">
+  <Display>DocumentLibraryForm</Display>
+  <Edit>DocumentLibraryForm</Edit>
+  <New>DocumentLibraryForm</New>
+</FormTemplates>
+</file>
+
+<file path=customXml/item3.xml><?xml version="1.0" encoding="utf-8"?>
 <ct:contentTypeSchema xmlns:ct="http://schemas.microsoft.com/office/2006/metadata/contentType" xmlns:ma="http://schemas.microsoft.com/office/2006/metadata/properties/metaAttributes" ct:_="" ma:_="" ma:contentTypeName="Document" ma:contentTypeID="0x0101009204A49901785041AF741C157FF60EBA" ma:contentTypeVersion="12" ma:contentTypeDescription="Create a new document." ma:contentTypeScope="" ma:versionID="2dc561ac532b927686394fff98d3cec6">
   <xsd:schema xmlns:xsd="http://www.w3.org/2001/XMLSchema" xmlns:xs="http://www.w3.org/2001/XMLSchema" xmlns:p="http://schemas.microsoft.com/office/2006/metadata/properties" xmlns:ns2="c7c738f6-68ec-422e-b0e4-3523873f7adf" xmlns:ns3="542b8847-f5d4-4c9f-bd30-657d16e5db1d" targetNamespace="http://schemas.microsoft.com/office/2006/metadata/properties" ma:root="true" ma:fieldsID="37215006c6ba2f10ad2271fcfa8576ba" ns2:_="" ns3:_="">
     <xsd:import namespace="c7c738f6-68ec-422e-b0e4-3523873f7adf"/>
@@ -4302,22 +4379,32 @@
 </ct:contentTypeSchema>
 </file>
 
-<file path=customXml/item2.xml><?xml version="1.0" encoding="utf-8"?>
-<?mso-contentType ?>
-<FormTemplates xmlns="http://schemas.microsoft.com/sharepoint/v3/contenttype/forms">
-  <Display>DocumentLibraryForm</Display>
-  <Edit>DocumentLibraryForm</Edit>
-  <New>DocumentLibraryForm</New>
-</FormTemplates>
+<file path=customXml/itemProps1.xml><?xml version="1.0" encoding="utf-8"?>
+<ds:datastoreItem xmlns:ds="http://schemas.openxmlformats.org/officeDocument/2006/customXml" ds:itemID="{221007C3-AD67-44B1-B137-2991E4E207A2}">
+  <ds:schemaRefs>
+    <ds:schemaRef ds:uri="c7c738f6-68ec-422e-b0e4-3523873f7adf"/>
+    <ds:schemaRef ds:uri="http://purl.org/dc/elements/1.1/"/>
+    <ds:schemaRef ds:uri="http://schemas.microsoft.com/office/2006/metadata/properties"/>
+    <ds:schemaRef ds:uri="http://schemas.openxmlformats.org/package/2006/metadata/core-properties"/>
+    <ds:schemaRef ds:uri="542b8847-f5d4-4c9f-bd30-657d16e5db1d"/>
+    <ds:schemaRef ds:uri="http://schemas.microsoft.com/office/2006/documentManagement/types"/>
+    <ds:schemaRef ds:uri="http://www.w3.org/XML/1998/namespace"/>
+    <ds:schemaRef ds:uri="http://schemas.microsoft.com/office/infopath/2007/PartnerControls"/>
+    <ds:schemaRef ds:uri="http://purl.org/dc/dcmitype/"/>
+    <ds:schemaRef ds:uri="http://purl.org/dc/terms/"/>
+  </ds:schemaRefs>
+</ds:datastoreItem>
 </file>
 
-<file path=customXml/item3.xml><?xml version="1.0" encoding="utf-8"?>
-<p:properties xmlns:p="http://schemas.microsoft.com/office/2006/metadata/properties" xmlns:xsi="http://www.w3.org/2001/XMLSchema-instance" xmlns:pc="http://schemas.microsoft.com/office/infopath/2007/PartnerControls">
-  <documentManagement/>
-</p:properties>
+<file path=customXml/itemProps2.xml><?xml version="1.0" encoding="utf-8"?>
+<ds:datastoreItem xmlns:ds="http://schemas.openxmlformats.org/officeDocument/2006/customXml" ds:itemID="{42C23066-3038-4EAE-A0EA-AB2B4833A6F1}">
+  <ds:schemaRefs>
+    <ds:schemaRef ds:uri="http://schemas.microsoft.com/sharepoint/v3/contenttype/forms"/>
+  </ds:schemaRefs>
+</ds:datastoreItem>
 </file>
 
-<file path=customXml/itemProps1.xml><?xml version="1.0" encoding="utf-8"?>
+<file path=customXml/itemProps3.xml><?xml version="1.0" encoding="utf-8"?>
 <ds:datastoreItem xmlns:ds="http://schemas.openxmlformats.org/officeDocument/2006/customXml" ds:itemID="{82C77EA6-48BC-4990-B9D9-3092A42A88E3}">
   <ds:schemaRefs>
     <ds:schemaRef ds:uri="http://schemas.microsoft.com/office/2006/metadata/contentType"/>
@@ -4336,31 +4423,6 @@
 </ds:datastoreItem>
 </file>
 
-<file path=customXml/itemProps2.xml><?xml version="1.0" encoding="utf-8"?>
-<ds:datastoreItem xmlns:ds="http://schemas.openxmlformats.org/officeDocument/2006/customXml" ds:itemID="{42C23066-3038-4EAE-A0EA-AB2B4833A6F1}">
-  <ds:schemaRefs>
-    <ds:schemaRef ds:uri="http://schemas.microsoft.com/sharepoint/v3/contenttype/forms"/>
-  </ds:schemaRefs>
-</ds:datastoreItem>
-</file>
-
-<file path=customXml/itemProps3.xml><?xml version="1.0" encoding="utf-8"?>
-<ds:datastoreItem xmlns:ds="http://schemas.openxmlformats.org/officeDocument/2006/customXml" ds:itemID="{221007C3-AD67-44B1-B137-2991E4E207A2}">
-  <ds:schemaRefs>
-    <ds:schemaRef ds:uri="c7c738f6-68ec-422e-b0e4-3523873f7adf"/>
-    <ds:schemaRef ds:uri="http://purl.org/dc/elements/1.1/"/>
-    <ds:schemaRef ds:uri="http://schemas.microsoft.com/office/2006/metadata/properties"/>
-    <ds:schemaRef ds:uri="http://schemas.openxmlformats.org/package/2006/metadata/core-properties"/>
-    <ds:schemaRef ds:uri="542b8847-f5d4-4c9f-bd30-657d16e5db1d"/>
-    <ds:schemaRef ds:uri="http://schemas.microsoft.com/office/2006/documentManagement/types"/>
-    <ds:schemaRef ds:uri="http://www.w3.org/XML/1998/namespace"/>
-    <ds:schemaRef ds:uri="http://schemas.microsoft.com/office/infopath/2007/PartnerControls"/>
-    <ds:schemaRef ds:uri="http://purl.org/dc/dcmitype/"/>
-    <ds:schemaRef ds:uri="http://purl.org/dc/terms/"/>
-  </ds:schemaRefs>
-</ds:datastoreItem>
-</file>
-
 <file path=docMetadata/LabelInfo.xml><?xml version="1.0" encoding="utf-8"?>
 <clbl:labelList xmlns:clbl="http://schemas.microsoft.com/office/2020/mipLabelMetadata">
   <clbl:label id="{7cf48d45-3ddb-4389-a9c1-c115526eb52e}" enabled="0" method="" siteId="{7cf48d45-3ddb-4389-a9c1-c115526eb52e}" removed="1"/>

</xml_diff>

<commit_message>
complete draft of presentation slide; link fixed
</commit_message>
<xml_diff>
--- a/docs/2024-Stat-Research-Day.pptx
+++ b/docs/2024-Stat-Research-Day.pptx
@@ -208,7 +208,7 @@
           <a:p>
             <a:fld id="{ECD1C33D-175C-4448-AC53-4345F676D392}" type="datetimeFigureOut">
               <a:rPr lang="en-US" smtClean="0"/>
-              <a:t>1/30/24</a:t>
+              <a:t>2/1/24</a:t>
             </a:fld>
             <a:endParaRPr lang="en-US" dirty="0"/>
           </a:p>
@@ -1991,7 +1991,7 @@
           <a:p>
             <a:fld id="{6FEC4368-C769-8143-B102-F97927FA2E0C}" type="datetimeFigureOut">
               <a:rPr lang="en-US" smtClean="0"/>
-              <a:t>1/30/24</a:t>
+              <a:t>2/1/24</a:t>
             </a:fld>
             <a:endParaRPr lang="en-US" dirty="0"/>
           </a:p>
@@ -2375,7 +2375,7 @@
         </p:spPr>
         <p:txBody>
           <a:bodyPr>
-            <a:normAutofit fontScale="92500" lnSpcReduction="20000"/>
+            <a:normAutofit fontScale="85000" lnSpcReduction="20000"/>
           </a:bodyPr>
           <a:lstStyle/>
           <a:p>
@@ -2400,7 +2400,7 @@
           </a:p>
           <a:p>
             <a:r>
-              <a:rPr lang="en-US" sz="1100" dirty="0">
+              <a:rPr lang="en-US" sz="1200" dirty="0">
                 <a:solidFill>
                   <a:srgbClr val="333333"/>
                 </a:solidFill>
@@ -2411,7 +2411,7 @@
           </a:p>
           <a:p>
             <a:r>
-              <a:rPr lang="en-US" sz="1100" dirty="0">
+              <a:rPr lang="en-US" sz="1200" dirty="0">
                 <a:solidFill>
                   <a:srgbClr val="333333"/>
                 </a:solidFill>
@@ -2422,7 +2422,7 @@
           </a:p>
           <a:p>
             <a:r>
-              <a:rPr lang="en-US" sz="1100" dirty="0">
+              <a:rPr lang="en-US" sz="1200" dirty="0">
                 <a:solidFill>
                   <a:srgbClr val="333333"/>
                 </a:solidFill>
@@ -2512,6 +2512,15 @@
             </a:endParaRPr>
           </a:p>
           <a:p>
+            <a:pPr lvl="1"/>
+            <a:endParaRPr lang="en-US" sz="800" dirty="0">
+              <a:solidFill>
+                <a:srgbClr val="333333"/>
+              </a:solidFill>
+              <a:latin typeface="Helvetica Neue" panose="02000503000000020004" pitchFamily="2" charset="0"/>
+            </a:endParaRPr>
+          </a:p>
+          <a:p>
             <a:endParaRPr lang="en-US" sz="1200" dirty="0">
               <a:solidFill>
                 <a:srgbClr val="333333"/>
@@ -2521,7 +2530,7 @@
           </a:p>
           <a:p>
             <a:r>
-              <a:rPr lang="en-US" sz="1100" dirty="0">
+              <a:rPr lang="en-US" sz="1200" dirty="0">
                 <a:solidFill>
                   <a:srgbClr val="333333"/>
                 </a:solidFill>
@@ -2532,7 +2541,7 @@
           </a:p>
           <a:p>
             <a:r>
-              <a:rPr lang="en-US" sz="1100" dirty="0">
+              <a:rPr lang="en-US" sz="1200" dirty="0">
                 <a:solidFill>
                   <a:srgbClr val="333333"/>
                 </a:solidFill>
@@ -2543,7 +2552,7 @@
           </a:p>
           <a:p>
             <a:r>
-              <a:rPr lang="en-US" sz="1100" b="0" i="0" dirty="0">
+              <a:rPr lang="en-US" sz="1200" b="0" i="0" dirty="0">
                 <a:solidFill>
                   <a:srgbClr val="333333"/>
                 </a:solidFill>
@@ -2555,7 +2564,7 @@
           </a:p>
           <a:p>
             <a:r>
-              <a:rPr lang="en-US" sz="1100" b="0" i="0" dirty="0">
+              <a:rPr lang="en-US" sz="1200" b="0" i="0" dirty="0">
                 <a:solidFill>
                   <a:srgbClr val="333333"/>
                 </a:solidFill>
@@ -2565,7 +2574,7 @@
               <a:t>Future: Evaluate competing methods of feedback; assess effectiveness, student engagement, scalability, </a:t>
             </a:r>
             <a:r>
-              <a:rPr lang="en-US" sz="1100" b="0" i="0" dirty="0" err="1">
+              <a:rPr lang="en-US" sz="1200" b="0" i="0" dirty="0" err="1">
                 <a:solidFill>
                   <a:srgbClr val="333333"/>
                 </a:solidFill>
@@ -2575,7 +2584,7 @@
               <a:t>etc</a:t>
             </a:r>
             <a:r>
-              <a:rPr lang="en-US" sz="1100" b="0" i="0" dirty="0">
+              <a:rPr lang="en-US" sz="1200" b="0" i="0" dirty="0">
                 <a:solidFill>
                   <a:srgbClr val="333333"/>
                 </a:solidFill>
@@ -2618,6 +2627,12 @@
           </a:p>
           <a:p>
             <a:pPr marL="0" indent="0" algn="l">
+              <a:lnSpc>
+                <a:spcPct val="120000"/>
+              </a:lnSpc>
+              <a:spcBef>
+                <a:spcPts val="100"/>
+              </a:spcBef>
               <a:buNone/>
             </a:pPr>
             <a:r>
@@ -2627,7 +2642,7 @@
                 </a:solidFill>
                 <a:latin typeface="Helvetica Neue" panose="02000503000000020004" pitchFamily="2" charset="0"/>
               </a:rPr>
-              <a:t>Li, Z., Lloyd, S., Beckman, M. D., &amp; </a:t>
+              <a:t>Li, Z., Susan Lloyd, Beckman, &amp; </a:t>
             </a:r>
             <a:r>
               <a:rPr lang="en-US" sz="900" dirty="0" err="1">
@@ -2645,7 +2660,7 @@
                 </a:solidFill>
                 <a:latin typeface="Helvetica Neue" panose="02000503000000020004" pitchFamily="2" charset="0"/>
               </a:rPr>
-              <a:t>, R. J. (2023). Answer-state Recurrent Relational Network (</a:t>
+              <a:t> (2023). Answer-state Recurrent Relational Network (</a:t>
             </a:r>
             <a:r>
               <a:rPr lang="en-US" sz="900" dirty="0" err="1">
@@ -2663,7 +2678,16 @@
                 </a:solidFill>
                 <a:latin typeface="Helvetica Neue" panose="02000503000000020004" pitchFamily="2" charset="0"/>
               </a:rPr>
-              <a:t>) for Constructed Response Assessment and Feedback Grouping. *Findings of the Conference on Empirical Methods in Natural Language Processing (EMNLP) 2023*.  </a:t>
+              <a:t>) for Constructed Response Assessment and Feedback Grouping. </a:t>
+            </a:r>
+            <a:r>
+              <a:rPr lang="en-US" sz="900" i="1" dirty="0">
+                <a:solidFill>
+                  <a:srgbClr val="333333"/>
+                </a:solidFill>
+                <a:latin typeface="Helvetica Neue" panose="02000503000000020004" pitchFamily="2" charset="0"/>
+              </a:rPr>
+              <a:t>Findings of the Conference on Empirical Methods in Natural Language Processing (EMNLP) 2023</a:t>
             </a:r>
             <a:r>
               <a:rPr lang="en-US" sz="900" dirty="0">
@@ -2671,29 +2695,35 @@
                   <a:srgbClr val="333333"/>
                 </a:solidFill>
                 <a:latin typeface="Helvetica Neue" panose="02000503000000020004" pitchFamily="2" charset="0"/>
-                <a:hlinkClick r:id="rId3"/>
-              </a:rPr>
-              <a:t>https://doi.org/10.18653/v1/2023.findings-emnlp.254</a:t>
-            </a:r>
-            <a:r>
-              <a:rPr lang="en-US" sz="900" dirty="0">
-                <a:solidFill>
-                  <a:srgbClr val="333333"/>
-                </a:solidFill>
-                <a:latin typeface="Helvetica Neue" panose="02000503000000020004" pitchFamily="2" charset="0"/>
               </a:rPr>
               <a:t> </a:t>
             </a:r>
-            <a:endParaRPr lang="en-US" sz="900" b="0" i="0" dirty="0">
+          </a:p>
+          <a:p>
+            <a:pPr marL="0" indent="0" algn="l">
+              <a:lnSpc>
+                <a:spcPct val="120000"/>
+              </a:lnSpc>
+              <a:spcBef>
+                <a:spcPts val="100"/>
+              </a:spcBef>
+              <a:buNone/>
+            </a:pPr>
+            <a:endParaRPr lang="en-US" sz="900" dirty="0">
               <a:solidFill>
                 <a:srgbClr val="333333"/>
               </a:solidFill>
-              <a:effectLst/>
               <a:latin typeface="Helvetica Neue" panose="02000503000000020004" pitchFamily="2" charset="0"/>
             </a:endParaRPr>
           </a:p>
           <a:p>
             <a:pPr marL="0" indent="0" algn="l">
+              <a:lnSpc>
+                <a:spcPct val="120000"/>
+              </a:lnSpc>
+              <a:spcBef>
+                <a:spcPts val="100"/>
+              </a:spcBef>
               <a:buNone/>
             </a:pPr>
             <a:r>
@@ -2704,7 +2734,7 @@
                 <a:effectLst/>
                 <a:latin typeface="Helvetica Neue" panose="02000503000000020004" pitchFamily="2" charset="0"/>
               </a:rPr>
-              <a:t>Lloyd, S. E., Beckman, M., Pearl, D., </a:t>
+              <a:t>Susan Lloyd, Beckman, Pearl, </a:t>
             </a:r>
             <a:r>
               <a:rPr lang="en-US" sz="900" b="0" i="0" dirty="0" err="1">
@@ -2724,7 +2754,7 @@
                 <a:effectLst/>
                 <a:latin typeface="Helvetica Neue" panose="02000503000000020004" pitchFamily="2" charset="0"/>
               </a:rPr>
-              <a:t>, R., Li, Z., &amp; Wang, Z. (2022). Foundations for AI-Assisted Formative Assessment Feedback for Short-Answer Tasks in Large-Enrollment Classes. In </a:t>
+              <a:t>, Li, &amp; Wang (2022). Foundations for AI-Assisted Formative Assessment Feedback for Short-Answer Tasks in Large-Enrollment Classes. In </a:t>
             </a:r>
             <a:r>
               <a:rPr lang="en-US" sz="900" b="0" i="1" dirty="0">
@@ -2766,16 +2796,6 @@
               </a:solidFill>
               <a:effectLst/>
               <a:latin typeface="Helvetica Neue" panose="02000503000000020004" pitchFamily="2" charset="0"/>
-            </a:endParaRPr>
-          </a:p>
-          <a:p>
-            <a:pPr marL="0" indent="0" algn="l">
-              <a:buNone/>
-            </a:pPr>
-            <a:endParaRPr lang="en-US" sz="1200" b="1" dirty="0">
-              <a:solidFill>
-                <a:schemeClr val="accent2"/>
-              </a:solidFill>
             </a:endParaRPr>
           </a:p>
         </p:txBody>
@@ -2794,8 +2814,8 @@
         </p:nvSpPr>
         <p:spPr>
           <a:xfrm>
-            <a:off x="9416191" y="4122221"/>
-            <a:ext cx="2542145" cy="1369606"/>
+            <a:off x="5587368" y="5887855"/>
+            <a:ext cx="2542145" cy="923330"/>
           </a:xfrm>
           <a:prstGeom prst="rect">
             <a:avLst/>
@@ -2807,39 +2827,6 @@
             <a:spAutoFit/>
           </a:bodyPr>
           <a:lstStyle/>
-          <a:p>
-            <a:r>
-              <a:rPr lang="en-US" sz="2000" b="1" dirty="0">
-                <a:solidFill>
-                  <a:schemeClr val="accent2"/>
-                </a:solidFill>
-              </a:rPr>
-              <a:t>Contact</a:t>
-            </a:r>
-            <a:r>
-              <a:rPr lang="en-US" sz="1900" b="1" dirty="0">
-                <a:solidFill>
-                  <a:schemeClr val="accent2"/>
-                </a:solidFill>
-              </a:rPr>
-              <a:t>:</a:t>
-            </a:r>
-          </a:p>
-          <a:p>
-            <a:r>
-              <a:rPr lang="en-US" sz="900" b="1" dirty="0">
-                <a:solidFill>
-                  <a:schemeClr val="accent2"/>
-                </a:solidFill>
-              </a:rPr>
-              <a:t> </a:t>
-            </a:r>
-            <a:endParaRPr lang="en-US" b="1" dirty="0">
-              <a:solidFill>
-                <a:schemeClr val="accent2"/>
-              </a:solidFill>
-            </a:endParaRPr>
-          </a:p>
           <a:p>
             <a:r>
               <a:rPr lang="en-US" dirty="0">
@@ -2906,7 +2893,7 @@
         </p:spPr>
         <p:txBody>
           <a:bodyPr vert="horz" lIns="91440" tIns="45720" rIns="91440" bIns="45720" rtlCol="0">
-            <a:normAutofit fontScale="92500" lnSpcReduction="10000"/>
+            <a:normAutofit fontScale="85000" lnSpcReduction="10000"/>
           </a:bodyPr>
           <a:lstStyle>
             <a:lvl1pPr marL="228600" indent="-228600" algn="l" defTabSz="914400" rtl="0" eaLnBrk="1" latinLnBrk="0" hangingPunct="1">
@@ -3204,7 +3191,25 @@
                 </a:solidFill>
                 <a:latin typeface="+mj-lt"/>
               </a:rPr>
-              <a:t>^^ 20 Second Survey ^^ </a:t>
+              <a:t>^^ 20 Second Survey </a:t>
+            </a:r>
+            <a:r>
+              <a:rPr lang="en-US" sz="2400" i="1" u="sng" dirty="0">
+                <a:solidFill>
+                  <a:schemeClr val="bg1"/>
+                </a:solidFill>
+                <a:latin typeface="+mj-lt"/>
+              </a:rPr>
+              <a:t>Before</a:t>
+            </a:r>
+            <a:r>
+              <a:rPr lang="en-US" sz="2400" dirty="0">
+                <a:solidFill>
+                  <a:schemeClr val="bg1"/>
+                </a:solidFill>
+                <a:latin typeface="+mj-lt"/>
+              </a:rPr>
+              <a:t> Talk ^^</a:t>
             </a:r>
           </a:p>
         </p:txBody>
@@ -3223,8 +3228,8 @@
         </p:nvSpPr>
         <p:spPr>
           <a:xfrm>
-            <a:off x="9140776" y="255494"/>
-            <a:ext cx="2939922" cy="2554545"/>
+            <a:off x="9140776" y="4418834"/>
+            <a:ext cx="2796119" cy="1754326"/>
           </a:xfrm>
           <a:prstGeom prst="rect">
             <a:avLst/>
@@ -3238,7 +3243,7 @@
           <a:lstStyle/>
           <a:p>
             <a:r>
-              <a:rPr lang="en-US" sz="2000" b="1" dirty="0">
+              <a:rPr lang="en-US" sz="1900" b="1" dirty="0">
                 <a:solidFill>
                   <a:schemeClr val="accent2"/>
                 </a:solidFill>
@@ -3248,47 +3253,23 @@
           </a:p>
           <a:p>
             <a:pPr marL="171450" indent="-171450">
-              <a:lnSpc>
-                <a:spcPct val="90000"/>
-              </a:lnSpc>
               <a:spcBef>
-                <a:spcPts val="1000"/>
+                <a:spcPts val="600"/>
               </a:spcBef>
               <a:buFont typeface="Arial" panose="020B0604020202020204" pitchFamily="34" charset="0"/>
               <a:buChar char="•"/>
             </a:pPr>
             <a:r>
-              <a:rPr lang="en-US" sz="1250" dirty="0">
-                <a:solidFill>
-                  <a:srgbClr val="333333"/>
-                </a:solidFill>
-                <a:latin typeface="Helvetica Neue" panose="02000503000000020004" pitchFamily="2" charset="0"/>
-              </a:rPr>
-              <a:t>Talk to me! </a:t>
-            </a:r>
-          </a:p>
-          <a:p>
-            <a:pPr marL="171450" indent="-171450">
-              <a:lnSpc>
-                <a:spcPct val="90000"/>
-              </a:lnSpc>
-              <a:spcBef>
-                <a:spcPts val="1000"/>
-              </a:spcBef>
-              <a:buFont typeface="Arial" panose="020B0604020202020204" pitchFamily="34" charset="0"/>
-              <a:buChar char="•"/>
-            </a:pPr>
-            <a:r>
-              <a:rPr lang="en-US" sz="1250" dirty="0">
-                <a:solidFill>
-                  <a:srgbClr val="333333"/>
-                </a:solidFill>
-                <a:latin typeface="Helvetica Neue" panose="02000503000000020004" pitchFamily="2" charset="0"/>
-              </a:rPr>
-              <a:t>SDSE Research Lab—Spring 24 </a:t>
-            </a:r>
-            <a:r>
-              <a:rPr lang="en-US" sz="1250" b="1" dirty="0">
+              <a:rPr lang="en-US" sz="1200" dirty="0">
+                <a:solidFill>
+                  <a:srgbClr val="333333"/>
+                </a:solidFill>
+                <a:latin typeface="Helvetica Neue" panose="02000503000000020004" pitchFamily="2" charset="0"/>
+              </a:rPr>
+              <a:t>SDSE Research Lab—Spring 2024 </a:t>
+            </a:r>
+            <a:r>
+              <a:rPr lang="en-US" sz="1200" b="1" dirty="0">
                 <a:solidFill>
                   <a:srgbClr val="333333"/>
                 </a:solidFill>
@@ -3297,7 +3278,7 @@
               <a:t>Wed @ 4pm in 421 Thomas </a:t>
             </a:r>
             <a:r>
-              <a:rPr lang="en-US" sz="1250" b="1" dirty="0" err="1">
+              <a:rPr lang="en-US" sz="1200" b="1" dirty="0" err="1">
                 <a:solidFill>
                   <a:srgbClr val="333333"/>
                 </a:solidFill>
@@ -3305,7 +3286,7 @@
               </a:rPr>
               <a:t>Bldg</a:t>
             </a:r>
-            <a:endParaRPr lang="en-US" sz="1250" b="1" dirty="0">
+            <a:endParaRPr lang="en-US" sz="1200" b="1" dirty="0">
               <a:solidFill>
                 <a:srgbClr val="333333"/>
               </a:solidFill>
@@ -3314,55 +3295,76 @@
           </a:p>
           <a:p>
             <a:pPr marL="171450" indent="-171450">
-              <a:lnSpc>
-                <a:spcPct val="90000"/>
-              </a:lnSpc>
               <a:spcBef>
-                <a:spcPts val="1000"/>
+                <a:spcPts val="600"/>
               </a:spcBef>
               <a:buFont typeface="Arial" panose="020B0604020202020204" pitchFamily="34" charset="0"/>
               <a:buChar char="•"/>
             </a:pPr>
             <a:r>
-              <a:rPr lang="en-US" sz="1250" dirty="0">
-                <a:solidFill>
-                  <a:srgbClr val="333333"/>
-                </a:solidFill>
-                <a:latin typeface="Helvetica Neue" panose="02000503000000020004" pitchFamily="2" charset="0"/>
-              </a:rPr>
-              <a:t>JSM Sessions</a:t>
+              <a:rPr lang="en-US" sz="1000" dirty="0">
+                <a:solidFill>
+                  <a:srgbClr val="333333"/>
+                </a:solidFill>
+                <a:latin typeface="Helvetica Neue" panose="02000503000000020004" pitchFamily="2" charset="0"/>
+              </a:rPr>
+              <a:t>Conferences: JSM; </a:t>
+            </a:r>
+            <a:r>
+              <a:rPr lang="en-US" sz="1000" dirty="0" err="1">
+                <a:solidFill>
+                  <a:srgbClr val="333333"/>
+                </a:solidFill>
+                <a:latin typeface="Helvetica Neue" panose="02000503000000020004" pitchFamily="2" charset="0"/>
+              </a:rPr>
+              <a:t>eCOTS</a:t>
+            </a:r>
+            <a:r>
+              <a:rPr lang="en-US" sz="1000" dirty="0">
+                <a:solidFill>
+                  <a:srgbClr val="333333"/>
+                </a:solidFill>
+                <a:latin typeface="Helvetica Neue" panose="02000503000000020004" pitchFamily="2" charset="0"/>
+              </a:rPr>
+              <a:t>; USCOTS</a:t>
             </a:r>
           </a:p>
           <a:p>
             <a:pPr marL="171450" indent="-171450">
-              <a:lnSpc>
-                <a:spcPct val="90000"/>
-              </a:lnSpc>
               <a:spcBef>
-                <a:spcPts val="1000"/>
+                <a:spcPts val="600"/>
               </a:spcBef>
               <a:buFont typeface="Arial" panose="020B0604020202020204" pitchFamily="34" charset="0"/>
               <a:buChar char="•"/>
             </a:pPr>
             <a:r>
-              <a:rPr lang="en-US" sz="1250" dirty="0" err="1">
-                <a:solidFill>
-                  <a:srgbClr val="333333"/>
-                </a:solidFill>
-                <a:latin typeface="Helvetica Neue" panose="02000503000000020004" pitchFamily="2" charset="0"/>
-              </a:rPr>
-              <a:t>eCOTS</a:t>
-            </a:r>
-            <a:r>
-              <a:rPr lang="en-US" sz="1250" dirty="0">
-                <a:solidFill>
-                  <a:srgbClr val="333333"/>
-                </a:solidFill>
-                <a:latin typeface="Helvetica Neue" panose="02000503000000020004" pitchFamily="2" charset="0"/>
-              </a:rPr>
-              <a:t> Conference</a:t>
-            </a:r>
-            <a:endParaRPr lang="en-US" sz="1250" b="1" dirty="0">
+              <a:rPr lang="en-US" sz="1000" dirty="0">
+                <a:solidFill>
+                  <a:srgbClr val="333333"/>
+                </a:solidFill>
+                <a:latin typeface="Helvetica Neue" panose="02000503000000020004" pitchFamily="2" charset="0"/>
+              </a:rPr>
+              <a:t>IASE catalog of PhD dissertations</a:t>
+            </a:r>
+          </a:p>
+          <a:p>
+            <a:pPr marL="171450" indent="-171450">
+              <a:spcBef>
+                <a:spcPts val="600"/>
+              </a:spcBef>
+              <a:buFont typeface="Arial" panose="020B0604020202020204" pitchFamily="34" charset="0"/>
+              <a:buChar char="•"/>
+            </a:pPr>
+            <a:r>
+              <a:rPr lang="en-US" sz="1000" dirty="0" err="1">
+                <a:solidFill>
+                  <a:srgbClr val="333333"/>
+                </a:solidFill>
+                <a:latin typeface="Helvetica Neue" panose="02000503000000020004" pitchFamily="2" charset="0"/>
+              </a:rPr>
+              <a:t>causeweb.org</a:t>
+            </a:r>
+            <a:endParaRPr lang="en-US" sz="1000" dirty="0">
               <a:solidFill>
                 <a:srgbClr val="333333"/>
               </a:solidFill>
@@ -3371,101 +3373,20 @@
           </a:p>
           <a:p>
             <a:pPr marL="171450" indent="-171450">
-              <a:lnSpc>
-                <a:spcPct val="90000"/>
-              </a:lnSpc>
               <a:spcBef>
-                <a:spcPts val="1000"/>
+                <a:spcPts val="600"/>
               </a:spcBef>
               <a:buFont typeface="Arial" panose="020B0604020202020204" pitchFamily="34" charset="0"/>
               <a:buChar char="•"/>
             </a:pPr>
             <a:r>
-              <a:rPr lang="en-US" sz="1250" dirty="0">
-                <a:solidFill>
-                  <a:srgbClr val="333333"/>
-                </a:solidFill>
-                <a:latin typeface="Helvetica Neue" panose="02000503000000020004" pitchFamily="2" charset="0"/>
-              </a:rPr>
-              <a:t>IASE catalog of PhD dissertations in statistics education</a:t>
-            </a:r>
-          </a:p>
-          <a:p>
-            <a:pPr marL="171450" indent="-171450">
-              <a:lnSpc>
-                <a:spcPct val="90000"/>
-              </a:lnSpc>
-              <a:spcBef>
-                <a:spcPts val="1000"/>
-              </a:spcBef>
-              <a:buFont typeface="Arial" panose="020B0604020202020204" pitchFamily="34" charset="0"/>
-              <a:buChar char="•"/>
-            </a:pPr>
-            <a:r>
-              <a:rPr lang="en-US" sz="1250" dirty="0" err="1">
-                <a:solidFill>
-                  <a:srgbClr val="333333"/>
-                </a:solidFill>
-                <a:latin typeface="Helvetica Neue" panose="02000503000000020004" pitchFamily="2" charset="0"/>
-              </a:rPr>
-              <a:t>causeweb.org</a:t>
-            </a:r>
-            <a:endParaRPr lang="en-US" sz="1250" dirty="0">
-              <a:solidFill>
-                <a:srgbClr val="333333"/>
-              </a:solidFill>
-              <a:latin typeface="Helvetica Neue" panose="02000503000000020004" pitchFamily="2" charset="0"/>
-            </a:endParaRPr>
-          </a:p>
-        </p:txBody>
-      </p:sp>
-      <p:sp>
-        <p:nvSpPr>
-          <p:cNvPr id="13" name="TextBox 12">
-            <a:extLst>
-              <a:ext uri="{FF2B5EF4-FFF2-40B4-BE49-F238E27FC236}">
-                <a16:creationId xmlns:a16="http://schemas.microsoft.com/office/drawing/2014/main" id="{50C62FFC-6032-BC01-F3C8-DF68FAA60A11}"/>
-              </a:ext>
-            </a:extLst>
-          </p:cNvPr>
-          <p:cNvSpPr txBox="1"/>
-          <p:nvPr/>
-        </p:nvSpPr>
-        <p:spPr>
-          <a:xfrm>
-            <a:off x="3438434" y="6517286"/>
-            <a:ext cx="4809074" cy="307777"/>
-          </a:xfrm>
-          <a:prstGeom prst="rect">
-            <a:avLst/>
-          </a:prstGeom>
-          <a:noFill/>
-        </p:spPr>
-        <p:txBody>
-          <a:bodyPr wrap="square">
-            <a:spAutoFit/>
-          </a:bodyPr>
-          <a:lstStyle/>
-          <a:p>
-            <a:r>
-              <a:rPr lang="en-US" sz="1400" b="1" i="0" dirty="0" err="1">
-                <a:solidFill>
-                  <a:schemeClr val="accent2"/>
-                </a:solidFill>
-                <a:effectLst/>
-                <a:latin typeface="Helvetica Neue" panose="02000503000000020004" pitchFamily="2" charset="0"/>
-              </a:rPr>
-              <a:t>mdbeckman.github.io</a:t>
-            </a:r>
-            <a:r>
-              <a:rPr lang="en-US" sz="1400" b="1" i="0" dirty="0">
-                <a:solidFill>
-                  <a:schemeClr val="accent2"/>
-                </a:solidFill>
-                <a:effectLst/>
-                <a:latin typeface="Helvetica Neue" panose="02000503000000020004" pitchFamily="2" charset="0"/>
-              </a:rPr>
-              <a:t>/2024-PSU-Stat-Research-Day</a:t>
+              <a:rPr lang="en-US" sz="1000" dirty="0">
+                <a:solidFill>
+                  <a:srgbClr val="333333"/>
+                </a:solidFill>
+                <a:latin typeface="Helvetica Neue" panose="02000503000000020004" pitchFamily="2" charset="0"/>
+              </a:rPr>
+              <a:t>Talk to me! </a:t>
             </a:r>
           </a:p>
         </p:txBody>
@@ -3485,7 +3406,7 @@
           <p:nvPr/>
         </p:nvPicPr>
         <p:blipFill>
-          <a:blip r:embed="rId4">
+          <a:blip r:embed="rId3">
             <a:extLst>
               <a:ext uri="{28A0092B-C50C-407E-A947-70E740481C1C}">
                 <a14:useLocalDpi xmlns:a14="http://schemas.microsoft.com/office/drawing/2010/main" val="0"/>
@@ -3521,7 +3442,7 @@
           <p:nvPr/>
         </p:nvPicPr>
         <p:blipFill>
-          <a:blip r:embed="rId5">
+          <a:blip r:embed="rId4">
             <a:extLst>
               <a:ext uri="{28A0092B-C50C-407E-A947-70E740481C1C}">
                 <a14:useLocalDpi xmlns:a14="http://schemas.microsoft.com/office/drawing/2010/main" val="0"/>
@@ -3534,7 +3455,7 @@
         </p:blipFill>
         <p:spPr>
           <a:xfrm>
-            <a:off x="38945" y="1532766"/>
+            <a:off x="17905" y="1522827"/>
             <a:ext cx="4871817" cy="2681425"/>
           </a:xfrm>
           <a:prstGeom prst="rect">
@@ -3557,7 +3478,7 @@
           <p:nvPr/>
         </p:nvPicPr>
         <p:blipFill>
-          <a:blip r:embed="rId6">
+          <a:blip r:embed="rId5">
             <a:extLst>
               <a:ext uri="{28A0092B-C50C-407E-A947-70E740481C1C}">
                 <a14:useLocalDpi xmlns:a14="http://schemas.microsoft.com/office/drawing/2010/main" val="0"/>
@@ -3578,6 +3499,391 @@
           </a:prstGeom>
         </p:spPr>
       </p:pic>
+      <p:sp>
+        <p:nvSpPr>
+          <p:cNvPr id="5" name="TextBox 4">
+            <a:extLst>
+              <a:ext uri="{FF2B5EF4-FFF2-40B4-BE49-F238E27FC236}">
+                <a16:creationId xmlns:a16="http://schemas.microsoft.com/office/drawing/2014/main" id="{BEC779EE-343C-5AD2-5686-9E9B963EF0BF}"/>
+              </a:ext>
+            </a:extLst>
+          </p:cNvPr>
+          <p:cNvSpPr txBox="1"/>
+          <p:nvPr/>
+        </p:nvSpPr>
+        <p:spPr>
+          <a:xfrm>
+            <a:off x="9140777" y="127748"/>
+            <a:ext cx="2939922" cy="4260654"/>
+          </a:xfrm>
+          <a:prstGeom prst="rect">
+            <a:avLst/>
+          </a:prstGeom>
+          <a:noFill/>
+        </p:spPr>
+        <p:txBody>
+          <a:bodyPr wrap="square" rtlCol="0">
+            <a:spAutoFit/>
+          </a:bodyPr>
+          <a:lstStyle/>
+          <a:p>
+            <a:r>
+              <a:rPr lang="en-US" sz="1900" b="1" dirty="0">
+                <a:solidFill>
+                  <a:schemeClr val="accent2"/>
+                </a:solidFill>
+              </a:rPr>
+              <a:t>Other Projects/Interests</a:t>
+            </a:r>
+          </a:p>
+          <a:p>
+            <a:pPr marL="171450" indent="-171450">
+              <a:lnSpc>
+                <a:spcPct val="90000"/>
+              </a:lnSpc>
+              <a:spcBef>
+                <a:spcPts val="1000"/>
+              </a:spcBef>
+              <a:buFont typeface="Arial" panose="020B0604020202020204" pitchFamily="34" charset="0"/>
+              <a:buChar char="•"/>
+            </a:pPr>
+            <a:r>
+              <a:rPr lang="en-US" sz="1250" dirty="0">
+                <a:solidFill>
+                  <a:srgbClr val="333333"/>
+                </a:solidFill>
+                <a:latin typeface="Helvetica Neue" panose="02000503000000020004" pitchFamily="2" charset="0"/>
+              </a:rPr>
+              <a:t>Educational Assessment</a:t>
+            </a:r>
+          </a:p>
+          <a:p>
+            <a:pPr>
+              <a:lnSpc>
+                <a:spcPct val="90000"/>
+              </a:lnSpc>
+              <a:spcBef>
+                <a:spcPts val="1000"/>
+              </a:spcBef>
+            </a:pPr>
+            <a:r>
+              <a:rPr lang="en-US" sz="900" dirty="0">
+                <a:solidFill>
+                  <a:srgbClr val="333333"/>
+                </a:solidFill>
+                <a:latin typeface="Helvetica Neue" panose="02000503000000020004" pitchFamily="2" charset="0"/>
+              </a:rPr>
+              <a:t>Developing &amp; analyzing tools to measure specific learning outcomes. Novel approaches to assessment.</a:t>
+            </a:r>
+          </a:p>
+          <a:p>
+            <a:pPr>
+              <a:lnSpc>
+                <a:spcPct val="90000"/>
+              </a:lnSpc>
+              <a:spcBef>
+                <a:spcPts val="1000"/>
+              </a:spcBef>
+            </a:pPr>
+            <a:r>
+              <a:rPr lang="en-US" sz="900" dirty="0">
+                <a:solidFill>
+                  <a:srgbClr val="333333"/>
+                </a:solidFill>
+                <a:latin typeface="Helvetica Neue" panose="02000503000000020004" pitchFamily="2" charset="0"/>
+              </a:rPr>
+              <a:t>”Tests" for research across academic institutions;</a:t>
+            </a:r>
+          </a:p>
+          <a:p>
+            <a:pPr>
+              <a:lnSpc>
+                <a:spcPct val="90000"/>
+              </a:lnSpc>
+              <a:spcBef>
+                <a:spcPts val="1000"/>
+              </a:spcBef>
+            </a:pPr>
+            <a:r>
+              <a:rPr lang="en-US" sz="900" dirty="0">
+                <a:solidFill>
+                  <a:srgbClr val="333333"/>
+                </a:solidFill>
+                <a:latin typeface="Helvetica Neue" panose="02000503000000020004" pitchFamily="2" charset="0"/>
+              </a:rPr>
+              <a:t>Formative assessment; e.g., feedback for self-regulated learning and/or adaptive instruction</a:t>
+            </a:r>
+          </a:p>
+          <a:p>
+            <a:pPr>
+              <a:lnSpc>
+                <a:spcPct val="90000"/>
+              </a:lnSpc>
+              <a:spcBef>
+                <a:spcPts val="1000"/>
+              </a:spcBef>
+            </a:pPr>
+            <a:r>
+              <a:rPr lang="en-US" sz="800" dirty="0">
+                <a:solidFill>
+                  <a:srgbClr val="333333"/>
+                </a:solidFill>
+                <a:latin typeface="Helvetica Neue" panose="02000503000000020004" pitchFamily="2" charset="0"/>
+              </a:rPr>
+              <a:t>&gt; </a:t>
+            </a:r>
+            <a:r>
+              <a:rPr lang="en-US" sz="800" dirty="0" err="1">
+                <a:solidFill>
+                  <a:srgbClr val="333333"/>
+                </a:solidFill>
+                <a:latin typeface="Helvetica Neue" panose="02000503000000020004" pitchFamily="2" charset="0"/>
+              </a:rPr>
+              <a:t>Sayali</a:t>
+            </a:r>
+            <a:r>
+              <a:rPr lang="en-US" sz="800" dirty="0">
+                <a:solidFill>
+                  <a:srgbClr val="333333"/>
+                </a:solidFill>
+                <a:latin typeface="Helvetica Neue" panose="02000503000000020004" pitchFamily="2" charset="0"/>
+              </a:rPr>
+              <a:t> </a:t>
+            </a:r>
+            <a:r>
+              <a:rPr lang="en-US" sz="800" dirty="0" err="1">
+                <a:solidFill>
+                  <a:srgbClr val="333333"/>
+                </a:solidFill>
+                <a:latin typeface="Helvetica Neue" panose="02000503000000020004" pitchFamily="2" charset="0"/>
+              </a:rPr>
+              <a:t>Phadke</a:t>
+            </a:r>
+            <a:r>
+              <a:rPr lang="en-US" sz="800" dirty="0">
+                <a:solidFill>
+                  <a:srgbClr val="333333"/>
+                </a:solidFill>
+                <a:latin typeface="Helvetica Neue" panose="02000503000000020004" pitchFamily="2" charset="0"/>
+              </a:rPr>
+              <a:t>, Beckman, Lock Morgan (in review). Measuring contextualized statistical literacy: Evidence from an isomorphic assessment.</a:t>
+            </a:r>
+            <a:endParaRPr lang="en-US" sz="900" dirty="0">
+              <a:solidFill>
+                <a:srgbClr val="333333"/>
+              </a:solidFill>
+              <a:latin typeface="Helvetica Neue" panose="02000503000000020004" pitchFamily="2" charset="0"/>
+            </a:endParaRPr>
+          </a:p>
+          <a:p>
+            <a:pPr marL="171450" indent="-171450">
+              <a:lnSpc>
+                <a:spcPct val="90000"/>
+              </a:lnSpc>
+              <a:spcBef>
+                <a:spcPts val="1000"/>
+              </a:spcBef>
+              <a:buFont typeface="Arial" panose="020B0604020202020204" pitchFamily="34" charset="0"/>
+              <a:buChar char="•"/>
+            </a:pPr>
+            <a:r>
+              <a:rPr lang="en-US" sz="1250" dirty="0">
+                <a:solidFill>
+                  <a:srgbClr val="333333"/>
+                </a:solidFill>
+                <a:latin typeface="Helvetica Neue" panose="02000503000000020004" pitchFamily="2" charset="0"/>
+              </a:rPr>
+              <a:t>Data Science Education</a:t>
+            </a:r>
+          </a:p>
+          <a:p>
+            <a:pPr marL="0" marR="0" lvl="0" indent="0" algn="l" defTabSz="914400" rtl="0" eaLnBrk="1" fontAlgn="auto" latinLnBrk="0" hangingPunct="1">
+              <a:lnSpc>
+                <a:spcPct val="90000"/>
+              </a:lnSpc>
+              <a:spcBef>
+                <a:spcPts val="1000"/>
+              </a:spcBef>
+              <a:spcAft>
+                <a:spcPts val="0"/>
+              </a:spcAft>
+              <a:buClrTx/>
+              <a:buSzTx/>
+              <a:buFontTx/>
+              <a:buNone/>
+              <a:tabLst/>
+              <a:defRPr/>
+            </a:pPr>
+            <a:r>
+              <a:rPr kumimoji="0" lang="en-US" sz="900" b="0" i="0" u="none" strike="noStrike" kern="1200" cap="none" spc="0" normalizeH="0" baseline="0" noProof="0" dirty="0">
+                <a:ln>
+                  <a:noFill/>
+                </a:ln>
+                <a:solidFill>
+                  <a:srgbClr val="333333"/>
+                </a:solidFill>
+                <a:effectLst/>
+                <a:uLnTx/>
+                <a:uFillTx/>
+                <a:latin typeface="Helvetica Neue" panose="02000503000000020004" pitchFamily="2" charset="0"/>
+                <a:ea typeface="+mn-ea"/>
+                <a:cs typeface="+mn-cs"/>
+              </a:rPr>
+              <a:t>Intersection of stat education &amp; computing education</a:t>
+            </a:r>
+          </a:p>
+          <a:p>
+            <a:pPr marL="0" marR="0" lvl="0" indent="0" algn="l" defTabSz="914400" rtl="0" eaLnBrk="1" fontAlgn="auto" latinLnBrk="0" hangingPunct="1">
+              <a:lnSpc>
+                <a:spcPct val="90000"/>
+              </a:lnSpc>
+              <a:spcBef>
+                <a:spcPts val="1000"/>
+              </a:spcBef>
+              <a:spcAft>
+                <a:spcPts val="0"/>
+              </a:spcAft>
+              <a:buClrTx/>
+              <a:buSzTx/>
+              <a:buFontTx/>
+              <a:buNone/>
+              <a:tabLst/>
+              <a:defRPr/>
+            </a:pPr>
+            <a:r>
+              <a:rPr kumimoji="0" lang="en-US" sz="900" b="0" i="0" u="none" strike="noStrike" kern="1200" cap="none" spc="0" normalizeH="0" baseline="0" noProof="0" dirty="0">
+                <a:ln>
+                  <a:noFill/>
+                </a:ln>
+                <a:solidFill>
+                  <a:srgbClr val="333333"/>
+                </a:solidFill>
+                <a:effectLst/>
+                <a:uLnTx/>
+                <a:uFillTx/>
+                <a:latin typeface="Helvetica Neue" panose="02000503000000020004" pitchFamily="2" charset="0"/>
+                <a:ea typeface="+mn-ea"/>
+                <a:cs typeface="+mn-cs"/>
+              </a:rPr>
+              <a:t>Studying DS/CS topics introduced as learning objectives in statistics curricula</a:t>
+            </a:r>
+          </a:p>
+          <a:p>
+            <a:pPr marL="0" marR="0" lvl="0" indent="0" algn="l" defTabSz="914400" rtl="0" eaLnBrk="1" fontAlgn="auto" latinLnBrk="0" hangingPunct="1">
+              <a:lnSpc>
+                <a:spcPct val="90000"/>
+              </a:lnSpc>
+              <a:spcBef>
+                <a:spcPts val="1000"/>
+              </a:spcBef>
+              <a:spcAft>
+                <a:spcPts val="0"/>
+              </a:spcAft>
+              <a:buClrTx/>
+              <a:buSzTx/>
+              <a:buFontTx/>
+              <a:buNone/>
+              <a:tabLst/>
+              <a:defRPr/>
+            </a:pPr>
+            <a:r>
+              <a:rPr kumimoji="0" lang="en-US" sz="900" b="0" i="0" u="none" strike="noStrike" kern="1200" cap="none" spc="0" normalizeH="0" baseline="0" noProof="0" dirty="0">
+                <a:ln>
+                  <a:noFill/>
+                </a:ln>
+                <a:solidFill>
+                  <a:srgbClr val="333333"/>
+                </a:solidFill>
+                <a:effectLst/>
+                <a:uLnTx/>
+                <a:uFillTx/>
+                <a:latin typeface="Helvetica Neue" panose="02000503000000020004" pitchFamily="2" charset="0"/>
+                <a:ea typeface="+mn-ea"/>
+                <a:cs typeface="+mn-cs"/>
+              </a:rPr>
+              <a:t>Data literacy, data acumen, EDA for Data Science</a:t>
+            </a:r>
+          </a:p>
+          <a:p>
+            <a:pPr marL="0" marR="0" lvl="0" indent="0" algn="l" defTabSz="914400" rtl="0" eaLnBrk="1" fontAlgn="auto" latinLnBrk="0" hangingPunct="1">
+              <a:lnSpc>
+                <a:spcPct val="90000"/>
+              </a:lnSpc>
+              <a:spcBef>
+                <a:spcPts val="1000"/>
+              </a:spcBef>
+              <a:spcAft>
+                <a:spcPts val="0"/>
+              </a:spcAft>
+              <a:buClrTx/>
+              <a:buSzTx/>
+              <a:buFontTx/>
+              <a:buNone/>
+              <a:tabLst/>
+              <a:defRPr/>
+            </a:pPr>
+            <a:r>
+              <a:rPr kumimoji="0" lang="en-US" sz="800" b="0" i="0" u="none" strike="noStrike" kern="1200" cap="none" spc="0" normalizeH="0" baseline="0" noProof="0" dirty="0">
+                <a:ln>
+                  <a:noFill/>
+                </a:ln>
+                <a:solidFill>
+                  <a:srgbClr val="333333"/>
+                </a:solidFill>
+                <a:effectLst/>
+                <a:uLnTx/>
+                <a:uFillTx/>
+                <a:latin typeface="Helvetica Neue" panose="02000503000000020004" pitchFamily="2" charset="0"/>
+                <a:ea typeface="+mn-ea"/>
+                <a:cs typeface="+mn-cs"/>
+              </a:rPr>
+              <a:t>&gt; Alyssa Hu, Hatfield, Beckman (in review). Exploring How Novices and Experts Engage in Computational Thinking with Data.</a:t>
+            </a:r>
+          </a:p>
+          <a:p>
+            <a:pPr marL="0" marR="0" lvl="0" indent="0" algn="l" defTabSz="914400" rtl="0" eaLnBrk="1" fontAlgn="auto" latinLnBrk="0" hangingPunct="1">
+              <a:lnSpc>
+                <a:spcPct val="90000"/>
+              </a:lnSpc>
+              <a:spcBef>
+                <a:spcPts val="1000"/>
+              </a:spcBef>
+              <a:spcAft>
+                <a:spcPts val="0"/>
+              </a:spcAft>
+              <a:buClrTx/>
+              <a:buSzTx/>
+              <a:buFontTx/>
+              <a:buNone/>
+              <a:tabLst/>
+              <a:defRPr/>
+            </a:pPr>
+            <a:r>
+              <a:rPr kumimoji="0" lang="en-US" sz="800" b="0" i="0" u="none" strike="noStrike" kern="1200" cap="none" spc="0" normalizeH="0" baseline="0" noProof="0" dirty="0">
+                <a:ln>
+                  <a:noFill/>
+                </a:ln>
+                <a:solidFill>
+                  <a:srgbClr val="333333"/>
+                </a:solidFill>
+                <a:effectLst/>
+                <a:uLnTx/>
+                <a:uFillTx/>
+                <a:latin typeface="Helvetica Neue" panose="02000503000000020004" pitchFamily="2" charset="0"/>
+                <a:ea typeface="+mn-ea"/>
+                <a:cs typeface="+mn-cs"/>
+              </a:rPr>
+              <a:t>&gt; Beckman et al (2021). Implementing Version Control With Git and GitHub as a Learning Objective in Statistics and Data Science Courses. JSDSE, 29(1).</a:t>
+            </a:r>
+            <a:endParaRPr lang="en-US" sz="1250" dirty="0">
+              <a:solidFill>
+                <a:srgbClr val="333333"/>
+              </a:solidFill>
+              <a:latin typeface="Helvetica Neue" panose="02000503000000020004" pitchFamily="2" charset="0"/>
+            </a:endParaRPr>
+          </a:p>
+        </p:txBody>
+      </p:sp>
     </p:spTree>
     <p:extLst>
       <p:ext uri="{BB962C8B-B14F-4D97-AF65-F5344CB8AC3E}">
@@ -4148,21 +4454,6 @@
 </file>
 
 <file path=customXml/item1.xml><?xml version="1.0" encoding="utf-8"?>
-<p:properties xmlns:p="http://schemas.microsoft.com/office/2006/metadata/properties" xmlns:xsi="http://www.w3.org/2001/XMLSchema-instance" xmlns:pc="http://schemas.microsoft.com/office/infopath/2007/PartnerControls">
-  <documentManagement/>
-</p:properties>
-</file>
-
-<file path=customXml/item2.xml><?xml version="1.0" encoding="utf-8"?>
-<?mso-contentType ?>
-<FormTemplates xmlns="http://schemas.microsoft.com/sharepoint/v3/contenttype/forms">
-  <Display>DocumentLibraryForm</Display>
-  <Edit>DocumentLibraryForm</Edit>
-  <New>DocumentLibraryForm</New>
-</FormTemplates>
-</file>
-
-<file path=customXml/item3.xml><?xml version="1.0" encoding="utf-8"?>
 <ct:contentTypeSchema xmlns:ct="http://schemas.microsoft.com/office/2006/metadata/contentType" xmlns:ma="http://schemas.microsoft.com/office/2006/metadata/properties/metaAttributes" ct:_="" ma:_="" ma:contentTypeName="Document" ma:contentTypeID="0x0101009204A49901785041AF741C157FF60EBA" ma:contentTypeVersion="12" ma:contentTypeDescription="Create a new document." ma:contentTypeScope="" ma:versionID="2dc561ac532b927686394fff98d3cec6">
   <xsd:schema xmlns:xsd="http://www.w3.org/2001/XMLSchema" xmlns:xs="http://www.w3.org/2001/XMLSchema" xmlns:p="http://schemas.microsoft.com/office/2006/metadata/properties" xmlns:ns2="c7c738f6-68ec-422e-b0e4-3523873f7adf" xmlns:ns3="542b8847-f5d4-4c9f-bd30-657d16e5db1d" targetNamespace="http://schemas.microsoft.com/office/2006/metadata/properties" ma:root="true" ma:fieldsID="37215006c6ba2f10ad2271fcfa8576ba" ns2:_="" ns3:_="">
     <xsd:import namespace="c7c738f6-68ec-422e-b0e4-3523873f7adf"/>
@@ -4379,32 +4670,22 @@
 </ct:contentTypeSchema>
 </file>
 
-<file path=customXml/itemProps1.xml><?xml version="1.0" encoding="utf-8"?>
-<ds:datastoreItem xmlns:ds="http://schemas.openxmlformats.org/officeDocument/2006/customXml" ds:itemID="{221007C3-AD67-44B1-B137-2991E4E207A2}">
-  <ds:schemaRefs>
-    <ds:schemaRef ds:uri="c7c738f6-68ec-422e-b0e4-3523873f7adf"/>
-    <ds:schemaRef ds:uri="http://purl.org/dc/elements/1.1/"/>
-    <ds:schemaRef ds:uri="http://schemas.microsoft.com/office/2006/metadata/properties"/>
-    <ds:schemaRef ds:uri="http://schemas.openxmlformats.org/package/2006/metadata/core-properties"/>
-    <ds:schemaRef ds:uri="542b8847-f5d4-4c9f-bd30-657d16e5db1d"/>
-    <ds:schemaRef ds:uri="http://schemas.microsoft.com/office/2006/documentManagement/types"/>
-    <ds:schemaRef ds:uri="http://www.w3.org/XML/1998/namespace"/>
-    <ds:schemaRef ds:uri="http://schemas.microsoft.com/office/infopath/2007/PartnerControls"/>
-    <ds:schemaRef ds:uri="http://purl.org/dc/dcmitype/"/>
-    <ds:schemaRef ds:uri="http://purl.org/dc/terms/"/>
-  </ds:schemaRefs>
-</ds:datastoreItem>
+<file path=customXml/item2.xml><?xml version="1.0" encoding="utf-8"?>
+<?mso-contentType ?>
+<FormTemplates xmlns="http://schemas.microsoft.com/sharepoint/v3/contenttype/forms">
+  <Display>DocumentLibraryForm</Display>
+  <Edit>DocumentLibraryForm</Edit>
+  <New>DocumentLibraryForm</New>
+</FormTemplates>
 </file>
 
-<file path=customXml/itemProps2.xml><?xml version="1.0" encoding="utf-8"?>
-<ds:datastoreItem xmlns:ds="http://schemas.openxmlformats.org/officeDocument/2006/customXml" ds:itemID="{42C23066-3038-4EAE-A0EA-AB2B4833A6F1}">
-  <ds:schemaRefs>
-    <ds:schemaRef ds:uri="http://schemas.microsoft.com/sharepoint/v3/contenttype/forms"/>
-  </ds:schemaRefs>
-</ds:datastoreItem>
+<file path=customXml/item3.xml><?xml version="1.0" encoding="utf-8"?>
+<p:properties xmlns:p="http://schemas.microsoft.com/office/2006/metadata/properties" xmlns:xsi="http://www.w3.org/2001/XMLSchema-instance" xmlns:pc="http://schemas.microsoft.com/office/infopath/2007/PartnerControls">
+  <documentManagement/>
+</p:properties>
 </file>
 
-<file path=customXml/itemProps3.xml><?xml version="1.0" encoding="utf-8"?>
+<file path=customXml/itemProps1.xml><?xml version="1.0" encoding="utf-8"?>
 <ds:datastoreItem xmlns:ds="http://schemas.openxmlformats.org/officeDocument/2006/customXml" ds:itemID="{82C77EA6-48BC-4990-B9D9-3092A42A88E3}">
   <ds:schemaRefs>
     <ds:schemaRef ds:uri="http://schemas.microsoft.com/office/2006/metadata/contentType"/>
@@ -4423,6 +4704,31 @@
 </ds:datastoreItem>
 </file>
 
+<file path=customXml/itemProps2.xml><?xml version="1.0" encoding="utf-8"?>
+<ds:datastoreItem xmlns:ds="http://schemas.openxmlformats.org/officeDocument/2006/customXml" ds:itemID="{42C23066-3038-4EAE-A0EA-AB2B4833A6F1}">
+  <ds:schemaRefs>
+    <ds:schemaRef ds:uri="http://schemas.microsoft.com/sharepoint/v3/contenttype/forms"/>
+  </ds:schemaRefs>
+</ds:datastoreItem>
+</file>
+
+<file path=customXml/itemProps3.xml><?xml version="1.0" encoding="utf-8"?>
+<ds:datastoreItem xmlns:ds="http://schemas.openxmlformats.org/officeDocument/2006/customXml" ds:itemID="{221007C3-AD67-44B1-B137-2991E4E207A2}">
+  <ds:schemaRefs>
+    <ds:schemaRef ds:uri="c7c738f6-68ec-422e-b0e4-3523873f7adf"/>
+    <ds:schemaRef ds:uri="http://purl.org/dc/elements/1.1/"/>
+    <ds:schemaRef ds:uri="http://schemas.microsoft.com/office/2006/metadata/properties"/>
+    <ds:schemaRef ds:uri="http://schemas.openxmlformats.org/package/2006/metadata/core-properties"/>
+    <ds:schemaRef ds:uri="542b8847-f5d4-4c9f-bd30-657d16e5db1d"/>
+    <ds:schemaRef ds:uri="http://schemas.microsoft.com/office/2006/documentManagement/types"/>
+    <ds:schemaRef ds:uri="http://www.w3.org/XML/1998/namespace"/>
+    <ds:schemaRef ds:uri="http://schemas.microsoft.com/office/infopath/2007/PartnerControls"/>
+    <ds:schemaRef ds:uri="http://purl.org/dc/dcmitype/"/>
+    <ds:schemaRef ds:uri="http://purl.org/dc/terms/"/>
+  </ds:schemaRefs>
+</ds:datastoreItem>
+</file>
+
 <file path=docMetadata/LabelInfo.xml><?xml version="1.0" encoding="utf-8"?>
 <clbl:labelList xmlns:clbl="http://schemas.microsoft.com/office/2020/mipLabelMetadata">
   <clbl:label id="{7cf48d45-3ddb-4389-a9c1-c115526eb52e}" enabled="0" method="" siteId="{7cf48d45-3ddb-4389-a9c1-c115526eb52e}" removed="1"/>

</xml_diff>